<commit_message>
Step 4. Cloud Platform: start Azure
</commit_message>
<xml_diff>
--- a/Step04-Cloud_Platforms_presentation.pptx
+++ b/Step04-Cloud_Platforms_presentation.pptx
@@ -6,7 +6,7 @@
     <p:sldMasterId id="2147483648" r:id="rId2"/>
   </p:sldMasterIdLst>
   <p:notesMasterIdLst>
-    <p:notesMasterId r:id="rId32"/>
+    <p:notesMasterId r:id="rId40"/>
   </p:notesMasterIdLst>
   <p:sldIdLst>
     <p:sldId id="302" r:id="rId3"/>
@@ -38,6 +38,14 @@
     <p:sldId id="326" r:id="rId29"/>
     <p:sldId id="327" r:id="rId30"/>
     <p:sldId id="328" r:id="rId31"/>
+    <p:sldId id="329" r:id="rId32"/>
+    <p:sldId id="330" r:id="rId33"/>
+    <p:sldId id="331" r:id="rId34"/>
+    <p:sldId id="332" r:id="rId35"/>
+    <p:sldId id="333" r:id="rId36"/>
+    <p:sldId id="334" r:id="rId37"/>
+    <p:sldId id="335" r:id="rId38"/>
+    <p:sldId id="336" r:id="rId39"/>
   </p:sldIdLst>
   <p:sldSz cx="12192000" cy="6858000"/>
   <p:notesSz cx="6858000" cy="9144000"/>
@@ -182,6 +190,14 @@
         <p14:section name="Azure" id="{37CA3DE0-8364-461F-87B3-E5B29FF81FB8}">
           <p14:sldIdLst>
             <p14:sldId id="328"/>
+            <p14:sldId id="329"/>
+            <p14:sldId id="330"/>
+            <p14:sldId id="331"/>
+            <p14:sldId id="332"/>
+            <p14:sldId id="333"/>
+            <p14:sldId id="334"/>
+            <p14:sldId id="335"/>
+            <p14:sldId id="336"/>
           </p14:sldIdLst>
         </p14:section>
       </p14:sectionLst>
@@ -196,7 +212,7 @@
 <file path=ppt/revisionInfo.xml><?xml version="1.0" encoding="utf-8"?>
 <p1510:revInfo xmlns:a="http://schemas.openxmlformats.org/drawingml/2006/main" xmlns:r="http://schemas.openxmlformats.org/officeDocument/2006/relationships" xmlns:p1510="http://schemas.microsoft.com/office/powerpoint/2015/10/main">
   <p1510:revLst>
-    <p1510:client id="{1BA64282-8772-44DD-ADE1-6DE4E20DF9D4}" v="15" dt="2024-01-30T16:28:30.717"/>
+    <p1510:client id="{1BA64282-8772-44DD-ADE1-6DE4E20DF9D4}" v="19" dt="2024-01-30T17:06:06.324"/>
   </p1510:revLst>
 </p1510:revInfo>
 </file>
@@ -1428,7 +1444,7 @@
   <pc:docChgLst>
     <pc:chgData name="Ihor Aleksandrov" userId="c3051032-6b87-4db2-b257-777a0106fbd9" providerId="ADAL" clId="{1BA64282-8772-44DD-ADE1-6DE4E20DF9D4}"/>
     <pc:docChg chg="undo custSel addSld delSld modSld sldOrd addSection delSection modSection">
-      <pc:chgData name="Ihor Aleksandrov" userId="c3051032-6b87-4db2-b257-777a0106fbd9" providerId="ADAL" clId="{1BA64282-8772-44DD-ADE1-6DE4E20DF9D4}" dt="2024-01-30T16:30:45.845" v="341" actId="20577"/>
+      <pc:chgData name="Ihor Aleksandrov" userId="c3051032-6b87-4db2-b257-777a0106fbd9" providerId="ADAL" clId="{1BA64282-8772-44DD-ADE1-6DE4E20DF9D4}" dt="2024-01-30T17:07:42.640" v="501" actId="2890"/>
       <pc:docMkLst>
         <pc:docMk/>
       </pc:docMkLst>
@@ -2319,6 +2335,197 @@
             <ac:spMk id="2" creationId="{18C18207-A109-5552-1541-0ABBAA316282}"/>
           </ac:spMkLst>
         </pc:spChg>
+      </pc:sldChg>
+      <pc:sldChg chg="modSp add mod ord">
+        <pc:chgData name="Ihor Aleksandrov" userId="c3051032-6b87-4db2-b257-777a0106fbd9" providerId="ADAL" clId="{1BA64282-8772-44DD-ADE1-6DE4E20DF9D4}" dt="2024-01-30T16:42:41.255" v="350" actId="20577"/>
+        <pc:sldMkLst>
+          <pc:docMk/>
+          <pc:sldMk cId="2502396658" sldId="329"/>
+        </pc:sldMkLst>
+        <pc:spChg chg="mod">
+          <ac:chgData name="Ihor Aleksandrov" userId="c3051032-6b87-4db2-b257-777a0106fbd9" providerId="ADAL" clId="{1BA64282-8772-44DD-ADE1-6DE4E20DF9D4}" dt="2024-01-30T16:42:41.255" v="350" actId="20577"/>
+          <ac:spMkLst>
+            <pc:docMk/>
+            <pc:sldMk cId="2502396658" sldId="329"/>
+            <ac:spMk id="2" creationId="{53C5D828-9666-E312-B574-9FE965A7D6BE}"/>
+          </ac:spMkLst>
+        </pc:spChg>
+      </pc:sldChg>
+      <pc:sldChg chg="modSp add mod">
+        <pc:chgData name="Ihor Aleksandrov" userId="c3051032-6b87-4db2-b257-777a0106fbd9" providerId="ADAL" clId="{1BA64282-8772-44DD-ADE1-6DE4E20DF9D4}" dt="2024-01-30T16:47:17.998" v="383" actId="20577"/>
+        <pc:sldMkLst>
+          <pc:docMk/>
+          <pc:sldMk cId="287166604" sldId="330"/>
+        </pc:sldMkLst>
+        <pc:spChg chg="mod">
+          <ac:chgData name="Ihor Aleksandrov" userId="c3051032-6b87-4db2-b257-777a0106fbd9" providerId="ADAL" clId="{1BA64282-8772-44DD-ADE1-6DE4E20DF9D4}" dt="2024-01-30T16:47:17.998" v="383" actId="20577"/>
+          <ac:spMkLst>
+            <pc:docMk/>
+            <pc:sldMk cId="287166604" sldId="330"/>
+            <ac:spMk id="2" creationId="{53C5D828-9666-E312-B574-9FE965A7D6BE}"/>
+          </ac:spMkLst>
+        </pc:spChg>
+      </pc:sldChg>
+      <pc:sldChg chg="addSp delSp modSp add mod">
+        <pc:chgData name="Ihor Aleksandrov" userId="c3051032-6b87-4db2-b257-777a0106fbd9" providerId="ADAL" clId="{1BA64282-8772-44DD-ADE1-6DE4E20DF9D4}" dt="2024-01-30T16:57:17.120" v="418" actId="5793"/>
+        <pc:sldMkLst>
+          <pc:docMk/>
+          <pc:sldMk cId="4118740463" sldId="331"/>
+        </pc:sldMkLst>
+        <pc:spChg chg="mod">
+          <ac:chgData name="Ihor Aleksandrov" userId="c3051032-6b87-4db2-b257-777a0106fbd9" providerId="ADAL" clId="{1BA64282-8772-44DD-ADE1-6DE4E20DF9D4}" dt="2024-01-30T16:57:17.120" v="418" actId="5793"/>
+          <ac:spMkLst>
+            <pc:docMk/>
+            <pc:sldMk cId="4118740463" sldId="331"/>
+            <ac:spMk id="2" creationId="{53C5D828-9666-E312-B574-9FE965A7D6BE}"/>
+          </ac:spMkLst>
+        </pc:spChg>
+        <pc:spChg chg="del">
+          <ac:chgData name="Ihor Aleksandrov" userId="c3051032-6b87-4db2-b257-777a0106fbd9" providerId="ADAL" clId="{1BA64282-8772-44DD-ADE1-6DE4E20DF9D4}" dt="2024-01-30T16:50:16.780" v="401" actId="478"/>
+          <ac:spMkLst>
+            <pc:docMk/>
+            <pc:sldMk cId="4118740463" sldId="331"/>
+            <ac:spMk id="5" creationId="{AD5CB6A8-170B-0A95-F7B1-2340F8B4CEF9}"/>
+          </ac:spMkLst>
+        </pc:spChg>
+        <pc:picChg chg="add mod">
+          <ac:chgData name="Ihor Aleksandrov" userId="c3051032-6b87-4db2-b257-777a0106fbd9" providerId="ADAL" clId="{1BA64282-8772-44DD-ADE1-6DE4E20DF9D4}" dt="2024-01-30T16:50:29.657" v="406" actId="1076"/>
+          <ac:picMkLst>
+            <pc:docMk/>
+            <pc:sldMk cId="4118740463" sldId="331"/>
+            <ac:picMk id="4" creationId="{A91F707B-939A-F8D1-6735-D94299CB63A1}"/>
+          </ac:picMkLst>
+        </pc:picChg>
+      </pc:sldChg>
+      <pc:sldChg chg="modSp add mod ord">
+        <pc:chgData name="Ihor Aleksandrov" userId="c3051032-6b87-4db2-b257-777a0106fbd9" providerId="ADAL" clId="{1BA64282-8772-44DD-ADE1-6DE4E20DF9D4}" dt="2024-01-30T16:57:40.893" v="450" actId="20577"/>
+        <pc:sldMkLst>
+          <pc:docMk/>
+          <pc:sldMk cId="246431689" sldId="332"/>
+        </pc:sldMkLst>
+        <pc:spChg chg="mod">
+          <ac:chgData name="Ihor Aleksandrov" userId="c3051032-6b87-4db2-b257-777a0106fbd9" providerId="ADAL" clId="{1BA64282-8772-44DD-ADE1-6DE4E20DF9D4}" dt="2024-01-30T16:57:40.893" v="450" actId="20577"/>
+          <ac:spMkLst>
+            <pc:docMk/>
+            <pc:sldMk cId="246431689" sldId="332"/>
+            <ac:spMk id="2" creationId="{53C5D828-9666-E312-B574-9FE965A7D6BE}"/>
+          </ac:spMkLst>
+        </pc:spChg>
+      </pc:sldChg>
+      <pc:sldChg chg="modSp add mod">
+        <pc:chgData name="Ihor Aleksandrov" userId="c3051032-6b87-4db2-b257-777a0106fbd9" providerId="ADAL" clId="{1BA64282-8772-44DD-ADE1-6DE4E20DF9D4}" dt="2024-01-30T17:00:01.192" v="453" actId="27636"/>
+        <pc:sldMkLst>
+          <pc:docMk/>
+          <pc:sldMk cId="3336478611" sldId="333"/>
+        </pc:sldMkLst>
+        <pc:spChg chg="mod">
+          <ac:chgData name="Ihor Aleksandrov" userId="c3051032-6b87-4db2-b257-777a0106fbd9" providerId="ADAL" clId="{1BA64282-8772-44DD-ADE1-6DE4E20DF9D4}" dt="2024-01-30T17:00:01.192" v="453" actId="27636"/>
+          <ac:spMkLst>
+            <pc:docMk/>
+            <pc:sldMk cId="3336478611" sldId="333"/>
+            <ac:spMk id="2" creationId="{53C5D828-9666-E312-B574-9FE965A7D6BE}"/>
+          </ac:spMkLst>
+        </pc:spChg>
+      </pc:sldChg>
+      <pc:sldChg chg="addSp delSp modSp add mod">
+        <pc:chgData name="Ihor Aleksandrov" userId="c3051032-6b87-4db2-b257-777a0106fbd9" providerId="ADAL" clId="{1BA64282-8772-44DD-ADE1-6DE4E20DF9D4}" dt="2024-01-30T17:02:09.478" v="465" actId="1076"/>
+        <pc:sldMkLst>
+          <pc:docMk/>
+          <pc:sldMk cId="4103443897" sldId="334"/>
+        </pc:sldMkLst>
+        <pc:spChg chg="mod">
+          <ac:chgData name="Ihor Aleksandrov" userId="c3051032-6b87-4db2-b257-777a0106fbd9" providerId="ADAL" clId="{1BA64282-8772-44DD-ADE1-6DE4E20DF9D4}" dt="2024-01-30T17:01:44.576" v="459" actId="27636"/>
+          <ac:spMkLst>
+            <pc:docMk/>
+            <pc:sldMk cId="4103443897" sldId="334"/>
+            <ac:spMk id="2" creationId="{53C5D828-9666-E312-B574-9FE965A7D6BE}"/>
+          </ac:spMkLst>
+        </pc:spChg>
+        <pc:spChg chg="del">
+          <ac:chgData name="Ihor Aleksandrov" userId="c3051032-6b87-4db2-b257-777a0106fbd9" providerId="ADAL" clId="{1BA64282-8772-44DD-ADE1-6DE4E20DF9D4}" dt="2024-01-30T17:02:00.152" v="460" actId="478"/>
+          <ac:spMkLst>
+            <pc:docMk/>
+            <pc:sldMk cId="4103443897" sldId="334"/>
+            <ac:spMk id="5" creationId="{AD5CB6A8-170B-0A95-F7B1-2340F8B4CEF9}"/>
+          </ac:spMkLst>
+        </pc:spChg>
+        <pc:picChg chg="add mod">
+          <ac:chgData name="Ihor Aleksandrov" userId="c3051032-6b87-4db2-b257-777a0106fbd9" providerId="ADAL" clId="{1BA64282-8772-44DD-ADE1-6DE4E20DF9D4}" dt="2024-01-30T17:02:09.478" v="465" actId="1076"/>
+          <ac:picMkLst>
+            <pc:docMk/>
+            <pc:sldMk cId="4103443897" sldId="334"/>
+            <ac:picMk id="4" creationId="{434808D8-9B40-EE3F-5B67-B5C4ECE37F68}"/>
+          </ac:picMkLst>
+        </pc:picChg>
+      </pc:sldChg>
+      <pc:sldChg chg="addSp delSp modSp add mod">
+        <pc:chgData name="Ihor Aleksandrov" userId="c3051032-6b87-4db2-b257-777a0106fbd9" providerId="ADAL" clId="{1BA64282-8772-44DD-ADE1-6DE4E20DF9D4}" dt="2024-01-30T17:05:44.140" v="475" actId="20577"/>
+        <pc:sldMkLst>
+          <pc:docMk/>
+          <pc:sldMk cId="3743280714" sldId="335"/>
+        </pc:sldMkLst>
+        <pc:spChg chg="mod">
+          <ac:chgData name="Ihor Aleksandrov" userId="c3051032-6b87-4db2-b257-777a0106fbd9" providerId="ADAL" clId="{1BA64282-8772-44DD-ADE1-6DE4E20DF9D4}" dt="2024-01-30T17:05:44.140" v="475" actId="20577"/>
+          <ac:spMkLst>
+            <pc:docMk/>
+            <pc:sldMk cId="3743280714" sldId="335"/>
+            <ac:spMk id="2" creationId="{53C5D828-9666-E312-B574-9FE965A7D6BE}"/>
+          </ac:spMkLst>
+        </pc:spChg>
+        <pc:picChg chg="del">
+          <ac:chgData name="Ihor Aleksandrov" userId="c3051032-6b87-4db2-b257-777a0106fbd9" providerId="ADAL" clId="{1BA64282-8772-44DD-ADE1-6DE4E20DF9D4}" dt="2024-01-30T17:03:39.533" v="468" actId="478"/>
+          <ac:picMkLst>
+            <pc:docMk/>
+            <pc:sldMk cId="3743280714" sldId="335"/>
+            <ac:picMk id="4" creationId="{434808D8-9B40-EE3F-5B67-B5C4ECE37F68}"/>
+          </ac:picMkLst>
+        </pc:picChg>
+        <pc:picChg chg="add mod">
+          <ac:chgData name="Ihor Aleksandrov" userId="c3051032-6b87-4db2-b257-777a0106fbd9" providerId="ADAL" clId="{1BA64282-8772-44DD-ADE1-6DE4E20DF9D4}" dt="2024-01-30T17:03:46.218" v="472" actId="1076"/>
+          <ac:picMkLst>
+            <pc:docMk/>
+            <pc:sldMk cId="3743280714" sldId="335"/>
+            <ac:picMk id="5" creationId="{59EC6999-954D-E7E0-8D23-E784949428CB}"/>
+          </ac:picMkLst>
+        </pc:picChg>
+      </pc:sldChg>
+      <pc:sldChg chg="addSp delSp modSp add mod">
+        <pc:chgData name="Ihor Aleksandrov" userId="c3051032-6b87-4db2-b257-777a0106fbd9" providerId="ADAL" clId="{1BA64282-8772-44DD-ADE1-6DE4E20DF9D4}" dt="2024-01-30T17:06:14.827" v="499" actId="1076"/>
+        <pc:sldMkLst>
+          <pc:docMk/>
+          <pc:sldMk cId="3674171182" sldId="336"/>
+        </pc:sldMkLst>
+        <pc:spChg chg="mod">
+          <ac:chgData name="Ihor Aleksandrov" userId="c3051032-6b87-4db2-b257-777a0106fbd9" providerId="ADAL" clId="{1BA64282-8772-44DD-ADE1-6DE4E20DF9D4}" dt="2024-01-30T17:05:57.067" v="493" actId="20577"/>
+          <ac:spMkLst>
+            <pc:docMk/>
+            <pc:sldMk cId="3674171182" sldId="336"/>
+            <ac:spMk id="2" creationId="{53C5D828-9666-E312-B574-9FE965A7D6BE}"/>
+          </ac:spMkLst>
+        </pc:spChg>
+        <pc:picChg chg="add mod">
+          <ac:chgData name="Ihor Aleksandrov" userId="c3051032-6b87-4db2-b257-777a0106fbd9" providerId="ADAL" clId="{1BA64282-8772-44DD-ADE1-6DE4E20DF9D4}" dt="2024-01-30T17:06:14.827" v="499" actId="1076"/>
+          <ac:picMkLst>
+            <pc:docMk/>
+            <pc:sldMk cId="3674171182" sldId="336"/>
+            <ac:picMk id="4" creationId="{2F1F014F-1E04-C6CB-13FB-8D68B70132ED}"/>
+          </ac:picMkLst>
+        </pc:picChg>
+        <pc:picChg chg="del">
+          <ac:chgData name="Ihor Aleksandrov" userId="c3051032-6b87-4db2-b257-777a0106fbd9" providerId="ADAL" clId="{1BA64282-8772-44DD-ADE1-6DE4E20DF9D4}" dt="2024-01-30T17:06:00.543" v="494" actId="478"/>
+          <ac:picMkLst>
+            <pc:docMk/>
+            <pc:sldMk cId="3674171182" sldId="336"/>
+            <ac:picMk id="5" creationId="{59EC6999-954D-E7E0-8D23-E784949428CB}"/>
+          </ac:picMkLst>
+        </pc:picChg>
+      </pc:sldChg>
+      <pc:sldChg chg="add del">
+        <pc:chgData name="Ihor Aleksandrov" userId="c3051032-6b87-4db2-b257-777a0106fbd9" providerId="ADAL" clId="{1BA64282-8772-44DD-ADE1-6DE4E20DF9D4}" dt="2024-01-30T17:07:42.640" v="501" actId="2890"/>
+        <pc:sldMkLst>
+          <pc:docMk/>
+          <pc:sldMk cId="2477819659" sldId="337"/>
+        </pc:sldMkLst>
       </pc:sldChg>
     </pc:docChg>
   </pc:docChgLst>
@@ -16186,6 +16393,1809 @@
 </p:sld>
 </file>
 
+<file path=ppt/slides/slide30.xml><?xml version="1.0" encoding="utf-8"?>
+<p:sld xmlns:a="http://schemas.openxmlformats.org/drawingml/2006/main" xmlns:r="http://schemas.openxmlformats.org/officeDocument/2006/relationships" xmlns:p="http://schemas.openxmlformats.org/presentationml/2006/main">
+  <p:cSld>
+    <p:bg>
+      <p:bgPr>
+        <a:solidFill>
+          <a:schemeClr val="bg1"/>
+        </a:solidFill>
+        <a:effectLst/>
+      </p:bgPr>
+    </p:bg>
+    <p:spTree>
+      <p:nvGrpSpPr>
+        <p:cNvPr id="1" name=""/>
+        <p:cNvGrpSpPr/>
+        <p:nvPr/>
+      </p:nvGrpSpPr>
+      <p:grpSpPr>
+        <a:xfrm>
+          <a:off x="0" y="0"/>
+          <a:ext cx="0" cy="0"/>
+          <a:chOff x="0" y="0"/>
+          <a:chExt cx="0" cy="0"/>
+        </a:xfrm>
+      </p:grpSpPr>
+      <p:sp>
+        <p:nvSpPr>
+          <p:cNvPr id="24" name="Down Arrow 7">
+            <a:extLst>
+              <a:ext uri="{FF2B5EF4-FFF2-40B4-BE49-F238E27FC236}">
+                <a16:creationId xmlns:a16="http://schemas.microsoft.com/office/drawing/2014/main" id="{D4771268-CB57-404A-9271-370EB28F6090}"/>
+              </a:ext>
+              <a:ext uri="{C183D7F6-B498-43B3-948B-1728B52AA6E4}">
+                <adec:decorative xmlns:adec="http://schemas.microsoft.com/office/drawing/2017/decorative" val="1"/>
+              </a:ext>
+            </a:extLst>
+          </p:cNvPr>
+          <p:cNvSpPr>
+            <a:spLocks noGrp="1" noRot="1" noChangeAspect="1" noMove="1" noResize="1" noEditPoints="1" noAdjustHandles="1" noChangeArrowheads="1" noChangeShapeType="1" noTextEdit="1"/>
+          </p:cNvSpPr>
+          <p:nvPr>
+            <p:extLst>
+              <p:ext uri="{386F3935-93C4-4BCD-93E2-E3B085C9AB24}">
+                <p16:designElem xmlns:p16="http://schemas.microsoft.com/office/powerpoint/2015/main" val="1"/>
+              </p:ext>
+            </p:extLst>
+          </p:nvPr>
+        </p:nvSpPr>
+        <p:spPr>
+          <a:xfrm rot="16200000">
+            <a:off x="800100" y="1491343"/>
+            <a:ext cx="3333749" cy="3499103"/>
+          </a:xfrm>
+          <a:prstGeom prst="downArrow">
+            <a:avLst>
+              <a:gd name="adj1" fmla="val 100000"/>
+              <a:gd name="adj2" fmla="val 15788"/>
+            </a:avLst>
+          </a:prstGeom>
+          <a:solidFill>
+            <a:srgbClr val="404040"/>
+          </a:solidFill>
+          <a:ln w="53975">
+            <a:noFill/>
+          </a:ln>
+        </p:spPr>
+        <p:style>
+          <a:lnRef idx="2">
+            <a:schemeClr val="accent1">
+              <a:shade val="50000"/>
+            </a:schemeClr>
+          </a:lnRef>
+          <a:fillRef idx="1">
+            <a:schemeClr val="accent1"/>
+          </a:fillRef>
+          <a:effectRef idx="0">
+            <a:schemeClr val="accent1"/>
+          </a:effectRef>
+          <a:fontRef idx="minor">
+            <a:schemeClr val="lt1"/>
+          </a:fontRef>
+        </p:style>
+        <p:txBody>
+          <a:bodyPr rtlCol="0" anchor="ctr"/>
+          <a:lstStyle/>
+          <a:p>
+            <a:pPr algn="ctr"/>
+            <a:endParaRPr lang="en-US"/>
+          </a:p>
+        </p:txBody>
+      </p:sp>
+      <p:sp>
+        <p:nvSpPr>
+          <p:cNvPr id="2" name="Title 1">
+            <a:extLst>
+              <a:ext uri="{FF2B5EF4-FFF2-40B4-BE49-F238E27FC236}">
+                <a16:creationId xmlns:a16="http://schemas.microsoft.com/office/drawing/2014/main" id="{53C5D828-9666-E312-B574-9FE965A7D6BE}"/>
+              </a:ext>
+            </a:extLst>
+          </p:cNvPr>
+          <p:cNvSpPr>
+            <a:spLocks noGrp="1"/>
+          </p:cNvSpPr>
+          <p:nvPr>
+            <p:ph type="title"/>
+          </p:nvPr>
+        </p:nvSpPr>
+        <p:spPr>
+          <a:xfrm>
+            <a:off x="889000" y="1967266"/>
+            <a:ext cx="2865582" cy="2547257"/>
+          </a:xfrm>
+          <a:noFill/>
+        </p:spPr>
+        <p:txBody>
+          <a:bodyPr vert="horz" lIns="91440" tIns="45720" rIns="91440" bIns="45720" rtlCol="0" anchor="ctr">
+            <a:normAutofit/>
+          </a:bodyPr>
+          <a:lstStyle/>
+          <a:p>
+            <a:pPr algn="ctr"/>
+            <a:r>
+              <a:rPr lang="en-US" sz="3600" kern="1200" dirty="0">
+                <a:solidFill>
+                  <a:srgbClr val="FFFFFF"/>
+                </a:solidFill>
+                <a:latin typeface="+mj-lt"/>
+                <a:ea typeface="+mj-ea"/>
+                <a:cs typeface="+mj-cs"/>
+              </a:rPr>
+              <a:t>Azure Fundamentals</a:t>
+            </a:r>
+          </a:p>
+        </p:txBody>
+      </p:sp>
+      <p:sp>
+        <p:nvSpPr>
+          <p:cNvPr id="3" name="Footer Placeholder 2">
+            <a:extLst>
+              <a:ext uri="{FF2B5EF4-FFF2-40B4-BE49-F238E27FC236}">
+                <a16:creationId xmlns:a16="http://schemas.microsoft.com/office/drawing/2014/main" id="{5AA19FA0-A765-8169-03F1-928E3EF7B595}"/>
+              </a:ext>
+            </a:extLst>
+          </p:cNvPr>
+          <p:cNvSpPr>
+            <a:spLocks noGrp="1"/>
+          </p:cNvSpPr>
+          <p:nvPr>
+            <p:ph type="ftr" sz="quarter" idx="11"/>
+          </p:nvPr>
+        </p:nvSpPr>
+        <p:spPr/>
+        <p:txBody>
+          <a:bodyPr/>
+          <a:lstStyle/>
+          <a:p>
+            <a:r>
+              <a:rPr lang="es-ES"/>
+              <a:t>Step 1 - Model - ver. 1</a:t>
+            </a:r>
+            <a:endParaRPr lang="ru-UA"/>
+          </a:p>
+        </p:txBody>
+      </p:sp>
+      <p:sp>
+        <p:nvSpPr>
+          <p:cNvPr id="5" name="Rectangle 4">
+            <a:extLst>
+              <a:ext uri="{FF2B5EF4-FFF2-40B4-BE49-F238E27FC236}">
+                <a16:creationId xmlns:a16="http://schemas.microsoft.com/office/drawing/2014/main" id="{AD5CB6A8-170B-0A95-F7B1-2340F8B4CEF9}"/>
+              </a:ext>
+            </a:extLst>
+          </p:cNvPr>
+          <p:cNvSpPr/>
+          <p:nvPr/>
+        </p:nvSpPr>
+        <p:spPr>
+          <a:xfrm>
+            <a:off x="5375564" y="1574019"/>
+            <a:ext cx="5624945" cy="3333750"/>
+          </a:xfrm>
+          <a:prstGeom prst="rect">
+            <a:avLst/>
+          </a:prstGeom>
+        </p:spPr>
+        <p:style>
+          <a:lnRef idx="2">
+            <a:schemeClr val="accent1">
+              <a:shade val="15000"/>
+            </a:schemeClr>
+          </a:lnRef>
+          <a:fillRef idx="1">
+            <a:schemeClr val="accent1"/>
+          </a:fillRef>
+          <a:effectRef idx="0">
+            <a:schemeClr val="accent1"/>
+          </a:effectRef>
+          <a:fontRef idx="minor">
+            <a:schemeClr val="lt1"/>
+          </a:fontRef>
+        </p:style>
+        <p:txBody>
+          <a:bodyPr rtlCol="0" anchor="ctr"/>
+          <a:lstStyle/>
+          <a:p>
+            <a:pPr algn="ctr"/>
+            <a:endParaRPr lang="ru-UA"/>
+          </a:p>
+        </p:txBody>
+      </p:sp>
+    </p:spTree>
+    <p:extLst>
+      <p:ext uri="{BB962C8B-B14F-4D97-AF65-F5344CB8AC3E}">
+        <p14:creationId xmlns:p14="http://schemas.microsoft.com/office/powerpoint/2010/main" val="2502396658"/>
+      </p:ext>
+    </p:extLst>
+  </p:cSld>
+  <p:clrMapOvr>
+    <a:masterClrMapping/>
+  </p:clrMapOvr>
+</p:sld>
+</file>
+
+<file path=ppt/slides/slide31.xml><?xml version="1.0" encoding="utf-8"?>
+<p:sld xmlns:a="http://schemas.openxmlformats.org/drawingml/2006/main" xmlns:r="http://schemas.openxmlformats.org/officeDocument/2006/relationships" xmlns:p="http://schemas.openxmlformats.org/presentationml/2006/main">
+  <p:cSld>
+    <p:bg>
+      <p:bgPr>
+        <a:solidFill>
+          <a:schemeClr val="bg1"/>
+        </a:solidFill>
+        <a:effectLst/>
+      </p:bgPr>
+    </p:bg>
+    <p:spTree>
+      <p:nvGrpSpPr>
+        <p:cNvPr id="1" name=""/>
+        <p:cNvGrpSpPr/>
+        <p:nvPr/>
+      </p:nvGrpSpPr>
+      <p:grpSpPr>
+        <a:xfrm>
+          <a:off x="0" y="0"/>
+          <a:ext cx="0" cy="0"/>
+          <a:chOff x="0" y="0"/>
+          <a:chExt cx="0" cy="0"/>
+        </a:xfrm>
+      </p:grpSpPr>
+      <p:sp>
+        <p:nvSpPr>
+          <p:cNvPr id="24" name="Down Arrow 7">
+            <a:extLst>
+              <a:ext uri="{FF2B5EF4-FFF2-40B4-BE49-F238E27FC236}">
+                <a16:creationId xmlns:a16="http://schemas.microsoft.com/office/drawing/2014/main" id="{D4771268-CB57-404A-9271-370EB28F6090}"/>
+              </a:ext>
+              <a:ext uri="{C183D7F6-B498-43B3-948B-1728B52AA6E4}">
+                <adec:decorative xmlns:adec="http://schemas.microsoft.com/office/drawing/2017/decorative" val="1"/>
+              </a:ext>
+            </a:extLst>
+          </p:cNvPr>
+          <p:cNvSpPr>
+            <a:spLocks noGrp="1" noRot="1" noChangeAspect="1" noMove="1" noResize="1" noEditPoints="1" noAdjustHandles="1" noChangeArrowheads="1" noChangeShapeType="1" noTextEdit="1"/>
+          </p:cNvSpPr>
+          <p:nvPr>
+            <p:extLst>
+              <p:ext uri="{386F3935-93C4-4BCD-93E2-E3B085C9AB24}">
+                <p16:designElem xmlns:p16="http://schemas.microsoft.com/office/powerpoint/2015/main" val="1"/>
+              </p:ext>
+            </p:extLst>
+          </p:nvPr>
+        </p:nvSpPr>
+        <p:spPr>
+          <a:xfrm rot="16200000">
+            <a:off x="800100" y="1491343"/>
+            <a:ext cx="3333749" cy="3499103"/>
+          </a:xfrm>
+          <a:prstGeom prst="downArrow">
+            <a:avLst>
+              <a:gd name="adj1" fmla="val 100000"/>
+              <a:gd name="adj2" fmla="val 15788"/>
+            </a:avLst>
+          </a:prstGeom>
+          <a:solidFill>
+            <a:srgbClr val="404040"/>
+          </a:solidFill>
+          <a:ln w="53975">
+            <a:noFill/>
+          </a:ln>
+        </p:spPr>
+        <p:style>
+          <a:lnRef idx="2">
+            <a:schemeClr val="accent1">
+              <a:shade val="50000"/>
+            </a:schemeClr>
+          </a:lnRef>
+          <a:fillRef idx="1">
+            <a:schemeClr val="accent1"/>
+          </a:fillRef>
+          <a:effectRef idx="0">
+            <a:schemeClr val="accent1"/>
+          </a:effectRef>
+          <a:fontRef idx="minor">
+            <a:schemeClr val="lt1"/>
+          </a:fontRef>
+        </p:style>
+        <p:txBody>
+          <a:bodyPr rtlCol="0" anchor="ctr"/>
+          <a:lstStyle/>
+          <a:p>
+            <a:pPr algn="ctr"/>
+            <a:endParaRPr lang="en-US"/>
+          </a:p>
+        </p:txBody>
+      </p:sp>
+      <p:sp>
+        <p:nvSpPr>
+          <p:cNvPr id="2" name="Title 1">
+            <a:extLst>
+              <a:ext uri="{FF2B5EF4-FFF2-40B4-BE49-F238E27FC236}">
+                <a16:creationId xmlns:a16="http://schemas.microsoft.com/office/drawing/2014/main" id="{53C5D828-9666-E312-B574-9FE965A7D6BE}"/>
+              </a:ext>
+            </a:extLst>
+          </p:cNvPr>
+          <p:cNvSpPr>
+            <a:spLocks noGrp="1"/>
+          </p:cNvSpPr>
+          <p:nvPr>
+            <p:ph type="title"/>
+          </p:nvPr>
+        </p:nvSpPr>
+        <p:spPr>
+          <a:xfrm>
+            <a:off x="889000" y="1967266"/>
+            <a:ext cx="2865582" cy="2547257"/>
+          </a:xfrm>
+          <a:noFill/>
+        </p:spPr>
+        <p:txBody>
+          <a:bodyPr vert="horz" lIns="91440" tIns="45720" rIns="91440" bIns="45720" rtlCol="0" anchor="ctr">
+            <a:normAutofit/>
+          </a:bodyPr>
+          <a:lstStyle/>
+          <a:p>
+            <a:pPr algn="ctr"/>
+            <a:r>
+              <a:rPr lang="en-US" sz="3600" kern="1200" dirty="0">
+                <a:solidFill>
+                  <a:srgbClr val="FFFFFF"/>
+                </a:solidFill>
+                <a:latin typeface="+mj-lt"/>
+                <a:ea typeface="+mj-ea"/>
+                <a:cs typeface="+mj-cs"/>
+              </a:rPr>
+              <a:t>Azure Identity - Microsoft </a:t>
+            </a:r>
+            <a:r>
+              <a:rPr lang="en-US" sz="3600" kern="1200" dirty="0" err="1">
+                <a:solidFill>
+                  <a:srgbClr val="FFFFFF"/>
+                </a:solidFill>
+                <a:latin typeface="+mj-lt"/>
+                <a:ea typeface="+mj-ea"/>
+                <a:cs typeface="+mj-cs"/>
+              </a:rPr>
+              <a:t>Entra</a:t>
+            </a:r>
+            <a:endParaRPr lang="en-US" sz="3600" kern="1200" dirty="0">
+              <a:solidFill>
+                <a:srgbClr val="FFFFFF"/>
+              </a:solidFill>
+              <a:latin typeface="+mj-lt"/>
+              <a:ea typeface="+mj-ea"/>
+              <a:cs typeface="+mj-cs"/>
+            </a:endParaRPr>
+          </a:p>
+        </p:txBody>
+      </p:sp>
+      <p:sp>
+        <p:nvSpPr>
+          <p:cNvPr id="3" name="Footer Placeholder 2">
+            <a:extLst>
+              <a:ext uri="{FF2B5EF4-FFF2-40B4-BE49-F238E27FC236}">
+                <a16:creationId xmlns:a16="http://schemas.microsoft.com/office/drawing/2014/main" id="{5AA19FA0-A765-8169-03F1-928E3EF7B595}"/>
+              </a:ext>
+            </a:extLst>
+          </p:cNvPr>
+          <p:cNvSpPr>
+            <a:spLocks noGrp="1"/>
+          </p:cNvSpPr>
+          <p:nvPr>
+            <p:ph type="ftr" sz="quarter" idx="11"/>
+          </p:nvPr>
+        </p:nvSpPr>
+        <p:spPr/>
+        <p:txBody>
+          <a:bodyPr/>
+          <a:lstStyle/>
+          <a:p>
+            <a:r>
+              <a:rPr lang="es-ES"/>
+              <a:t>Step 1 - Model - ver. 1</a:t>
+            </a:r>
+            <a:endParaRPr lang="ru-UA"/>
+          </a:p>
+        </p:txBody>
+      </p:sp>
+      <p:sp>
+        <p:nvSpPr>
+          <p:cNvPr id="5" name="Rectangle 4">
+            <a:extLst>
+              <a:ext uri="{FF2B5EF4-FFF2-40B4-BE49-F238E27FC236}">
+                <a16:creationId xmlns:a16="http://schemas.microsoft.com/office/drawing/2014/main" id="{AD5CB6A8-170B-0A95-F7B1-2340F8B4CEF9}"/>
+              </a:ext>
+            </a:extLst>
+          </p:cNvPr>
+          <p:cNvSpPr/>
+          <p:nvPr/>
+        </p:nvSpPr>
+        <p:spPr>
+          <a:xfrm>
+            <a:off x="5375564" y="1574019"/>
+            <a:ext cx="5624945" cy="3333750"/>
+          </a:xfrm>
+          <a:prstGeom prst="rect">
+            <a:avLst/>
+          </a:prstGeom>
+        </p:spPr>
+        <p:style>
+          <a:lnRef idx="2">
+            <a:schemeClr val="accent1">
+              <a:shade val="15000"/>
+            </a:schemeClr>
+          </a:lnRef>
+          <a:fillRef idx="1">
+            <a:schemeClr val="accent1"/>
+          </a:fillRef>
+          <a:effectRef idx="0">
+            <a:schemeClr val="accent1"/>
+          </a:effectRef>
+          <a:fontRef idx="minor">
+            <a:schemeClr val="lt1"/>
+          </a:fontRef>
+        </p:style>
+        <p:txBody>
+          <a:bodyPr rtlCol="0" anchor="ctr"/>
+          <a:lstStyle/>
+          <a:p>
+            <a:pPr algn="ctr"/>
+            <a:endParaRPr lang="ru-UA"/>
+          </a:p>
+        </p:txBody>
+      </p:sp>
+    </p:spTree>
+    <p:extLst>
+      <p:ext uri="{BB962C8B-B14F-4D97-AF65-F5344CB8AC3E}">
+        <p14:creationId xmlns:p14="http://schemas.microsoft.com/office/powerpoint/2010/main" val="287166604"/>
+      </p:ext>
+    </p:extLst>
+  </p:cSld>
+  <p:clrMapOvr>
+    <a:masterClrMapping/>
+  </p:clrMapOvr>
+</p:sld>
+</file>
+
+<file path=ppt/slides/slide32.xml><?xml version="1.0" encoding="utf-8"?>
+<p:sld xmlns:a="http://schemas.openxmlformats.org/drawingml/2006/main" xmlns:r="http://schemas.openxmlformats.org/officeDocument/2006/relationships" xmlns:p="http://schemas.openxmlformats.org/presentationml/2006/main">
+  <p:cSld>
+    <p:bg>
+      <p:bgPr>
+        <a:solidFill>
+          <a:schemeClr val="bg1"/>
+        </a:solidFill>
+        <a:effectLst/>
+      </p:bgPr>
+    </p:bg>
+    <p:spTree>
+      <p:nvGrpSpPr>
+        <p:cNvPr id="1" name=""/>
+        <p:cNvGrpSpPr/>
+        <p:nvPr/>
+      </p:nvGrpSpPr>
+      <p:grpSpPr>
+        <a:xfrm>
+          <a:off x="0" y="0"/>
+          <a:ext cx="0" cy="0"/>
+          <a:chOff x="0" y="0"/>
+          <a:chExt cx="0" cy="0"/>
+        </a:xfrm>
+      </p:grpSpPr>
+      <p:sp>
+        <p:nvSpPr>
+          <p:cNvPr id="24" name="Down Arrow 7">
+            <a:extLst>
+              <a:ext uri="{FF2B5EF4-FFF2-40B4-BE49-F238E27FC236}">
+                <a16:creationId xmlns:a16="http://schemas.microsoft.com/office/drawing/2014/main" id="{D4771268-CB57-404A-9271-370EB28F6090}"/>
+              </a:ext>
+              <a:ext uri="{C183D7F6-B498-43B3-948B-1728B52AA6E4}">
+                <adec:decorative xmlns:adec="http://schemas.microsoft.com/office/drawing/2017/decorative" val="1"/>
+              </a:ext>
+            </a:extLst>
+          </p:cNvPr>
+          <p:cNvSpPr>
+            <a:spLocks noGrp="1" noRot="1" noChangeAspect="1" noMove="1" noResize="1" noEditPoints="1" noAdjustHandles="1" noChangeArrowheads="1" noChangeShapeType="1" noTextEdit="1"/>
+          </p:cNvSpPr>
+          <p:nvPr>
+            <p:extLst>
+              <p:ext uri="{386F3935-93C4-4BCD-93E2-E3B085C9AB24}">
+                <p16:designElem xmlns:p16="http://schemas.microsoft.com/office/powerpoint/2015/main" val="1"/>
+              </p:ext>
+            </p:extLst>
+          </p:nvPr>
+        </p:nvSpPr>
+        <p:spPr>
+          <a:xfrm rot="16200000">
+            <a:off x="800100" y="1491343"/>
+            <a:ext cx="3333749" cy="3499103"/>
+          </a:xfrm>
+          <a:prstGeom prst="downArrow">
+            <a:avLst>
+              <a:gd name="adj1" fmla="val 100000"/>
+              <a:gd name="adj2" fmla="val 15788"/>
+            </a:avLst>
+          </a:prstGeom>
+          <a:solidFill>
+            <a:srgbClr val="404040"/>
+          </a:solidFill>
+          <a:ln w="53975">
+            <a:noFill/>
+          </a:ln>
+        </p:spPr>
+        <p:style>
+          <a:lnRef idx="2">
+            <a:schemeClr val="accent1">
+              <a:shade val="50000"/>
+            </a:schemeClr>
+          </a:lnRef>
+          <a:fillRef idx="1">
+            <a:schemeClr val="accent1"/>
+          </a:fillRef>
+          <a:effectRef idx="0">
+            <a:schemeClr val="accent1"/>
+          </a:effectRef>
+          <a:fontRef idx="minor">
+            <a:schemeClr val="lt1"/>
+          </a:fontRef>
+        </p:style>
+        <p:txBody>
+          <a:bodyPr rtlCol="0" anchor="ctr"/>
+          <a:lstStyle/>
+          <a:p>
+            <a:pPr algn="ctr"/>
+            <a:endParaRPr lang="en-US"/>
+          </a:p>
+        </p:txBody>
+      </p:sp>
+      <p:sp>
+        <p:nvSpPr>
+          <p:cNvPr id="2" name="Title 1">
+            <a:extLst>
+              <a:ext uri="{FF2B5EF4-FFF2-40B4-BE49-F238E27FC236}">
+                <a16:creationId xmlns:a16="http://schemas.microsoft.com/office/drawing/2014/main" id="{53C5D828-9666-E312-B574-9FE965A7D6BE}"/>
+              </a:ext>
+            </a:extLst>
+          </p:cNvPr>
+          <p:cNvSpPr>
+            <a:spLocks noGrp="1"/>
+          </p:cNvSpPr>
+          <p:nvPr>
+            <p:ph type="title"/>
+          </p:nvPr>
+        </p:nvSpPr>
+        <p:spPr>
+          <a:xfrm>
+            <a:off x="889000" y="1967266"/>
+            <a:ext cx="2865582" cy="2547257"/>
+          </a:xfrm>
+          <a:noFill/>
+        </p:spPr>
+        <p:txBody>
+          <a:bodyPr vert="horz" lIns="91440" tIns="45720" rIns="91440" bIns="45720" rtlCol="0" anchor="ctr">
+            <a:normAutofit/>
+          </a:bodyPr>
+          <a:lstStyle/>
+          <a:p>
+            <a:pPr algn="ctr"/>
+            <a:r>
+              <a:rPr lang="en-US" sz="3600" kern="1200" dirty="0">
+                <a:solidFill>
+                  <a:srgbClr val="FFFFFF"/>
+                </a:solidFill>
+                <a:latin typeface="+mj-lt"/>
+                <a:ea typeface="+mj-ea"/>
+                <a:cs typeface="+mj-cs"/>
+              </a:rPr>
+              <a:t>Azure </a:t>
+            </a:r>
+            <a:r>
+              <a:rPr lang="en-US" sz="3600" dirty="0">
+                <a:solidFill>
+                  <a:srgbClr val="FFFFFF"/>
+                </a:solidFill>
+              </a:rPr>
+              <a:t>Compute – Azure VM</a:t>
+            </a:r>
+            <a:endParaRPr lang="en-US" sz="3600" kern="1200" dirty="0">
+              <a:solidFill>
+                <a:srgbClr val="FFFFFF"/>
+              </a:solidFill>
+              <a:latin typeface="+mj-lt"/>
+              <a:ea typeface="+mj-ea"/>
+              <a:cs typeface="+mj-cs"/>
+            </a:endParaRPr>
+          </a:p>
+        </p:txBody>
+      </p:sp>
+      <p:sp>
+        <p:nvSpPr>
+          <p:cNvPr id="3" name="Footer Placeholder 2">
+            <a:extLst>
+              <a:ext uri="{FF2B5EF4-FFF2-40B4-BE49-F238E27FC236}">
+                <a16:creationId xmlns:a16="http://schemas.microsoft.com/office/drawing/2014/main" id="{5AA19FA0-A765-8169-03F1-928E3EF7B595}"/>
+              </a:ext>
+            </a:extLst>
+          </p:cNvPr>
+          <p:cNvSpPr>
+            <a:spLocks noGrp="1"/>
+          </p:cNvSpPr>
+          <p:nvPr>
+            <p:ph type="ftr" sz="quarter" idx="11"/>
+          </p:nvPr>
+        </p:nvSpPr>
+        <p:spPr/>
+        <p:txBody>
+          <a:bodyPr/>
+          <a:lstStyle/>
+          <a:p>
+            <a:r>
+              <a:rPr lang="es-ES"/>
+              <a:t>Step 1 - Model - ver. 1</a:t>
+            </a:r>
+            <a:endParaRPr lang="ru-UA"/>
+          </a:p>
+        </p:txBody>
+      </p:sp>
+      <p:pic>
+        <p:nvPicPr>
+          <p:cNvPr id="4" name="Picture 3">
+            <a:extLst>
+              <a:ext uri="{FF2B5EF4-FFF2-40B4-BE49-F238E27FC236}">
+                <a16:creationId xmlns:a16="http://schemas.microsoft.com/office/drawing/2014/main" id="{A91F707B-939A-F8D1-6735-D94299CB63A1}"/>
+              </a:ext>
+            </a:extLst>
+          </p:cNvPr>
+          <p:cNvPicPr>
+            <a:picLocks noChangeAspect="1"/>
+          </p:cNvPicPr>
+          <p:nvPr/>
+        </p:nvPicPr>
+        <p:blipFill>
+          <a:blip r:embed="rId2"/>
+          <a:stretch>
+            <a:fillRect/>
+          </a:stretch>
+        </p:blipFill>
+        <p:spPr>
+          <a:xfrm>
+            <a:off x="4818065" y="1372899"/>
+            <a:ext cx="6569012" cy="4112202"/>
+          </a:xfrm>
+          <a:prstGeom prst="rect">
+            <a:avLst/>
+          </a:prstGeom>
+        </p:spPr>
+      </p:pic>
+    </p:spTree>
+    <p:extLst>
+      <p:ext uri="{BB962C8B-B14F-4D97-AF65-F5344CB8AC3E}">
+        <p14:creationId xmlns:p14="http://schemas.microsoft.com/office/powerpoint/2010/main" val="4118740463"/>
+      </p:ext>
+    </p:extLst>
+  </p:cSld>
+  <p:clrMapOvr>
+    <a:masterClrMapping/>
+  </p:clrMapOvr>
+</p:sld>
+</file>
+
+<file path=ppt/slides/slide33.xml><?xml version="1.0" encoding="utf-8"?>
+<p:sld xmlns:a="http://schemas.openxmlformats.org/drawingml/2006/main" xmlns:r="http://schemas.openxmlformats.org/officeDocument/2006/relationships" xmlns:p="http://schemas.openxmlformats.org/presentationml/2006/main">
+  <p:cSld>
+    <p:bg>
+      <p:bgPr>
+        <a:solidFill>
+          <a:schemeClr val="bg1"/>
+        </a:solidFill>
+        <a:effectLst/>
+      </p:bgPr>
+    </p:bg>
+    <p:spTree>
+      <p:nvGrpSpPr>
+        <p:cNvPr id="1" name=""/>
+        <p:cNvGrpSpPr/>
+        <p:nvPr/>
+      </p:nvGrpSpPr>
+      <p:grpSpPr>
+        <a:xfrm>
+          <a:off x="0" y="0"/>
+          <a:ext cx="0" cy="0"/>
+          <a:chOff x="0" y="0"/>
+          <a:chExt cx="0" cy="0"/>
+        </a:xfrm>
+      </p:grpSpPr>
+      <p:sp>
+        <p:nvSpPr>
+          <p:cNvPr id="24" name="Down Arrow 7">
+            <a:extLst>
+              <a:ext uri="{FF2B5EF4-FFF2-40B4-BE49-F238E27FC236}">
+                <a16:creationId xmlns:a16="http://schemas.microsoft.com/office/drawing/2014/main" id="{D4771268-CB57-404A-9271-370EB28F6090}"/>
+              </a:ext>
+              <a:ext uri="{C183D7F6-B498-43B3-948B-1728B52AA6E4}">
+                <adec:decorative xmlns:adec="http://schemas.microsoft.com/office/drawing/2017/decorative" val="1"/>
+              </a:ext>
+            </a:extLst>
+          </p:cNvPr>
+          <p:cNvSpPr>
+            <a:spLocks noGrp="1" noRot="1" noChangeAspect="1" noMove="1" noResize="1" noEditPoints="1" noAdjustHandles="1" noChangeArrowheads="1" noChangeShapeType="1" noTextEdit="1"/>
+          </p:cNvSpPr>
+          <p:nvPr>
+            <p:extLst>
+              <p:ext uri="{386F3935-93C4-4BCD-93E2-E3B085C9AB24}">
+                <p16:designElem xmlns:p16="http://schemas.microsoft.com/office/powerpoint/2015/main" val="1"/>
+              </p:ext>
+            </p:extLst>
+          </p:nvPr>
+        </p:nvSpPr>
+        <p:spPr>
+          <a:xfrm rot="16200000">
+            <a:off x="800100" y="1491343"/>
+            <a:ext cx="3333749" cy="3499103"/>
+          </a:xfrm>
+          <a:prstGeom prst="downArrow">
+            <a:avLst>
+              <a:gd name="adj1" fmla="val 100000"/>
+              <a:gd name="adj2" fmla="val 15788"/>
+            </a:avLst>
+          </a:prstGeom>
+          <a:solidFill>
+            <a:srgbClr val="404040"/>
+          </a:solidFill>
+          <a:ln w="53975">
+            <a:noFill/>
+          </a:ln>
+        </p:spPr>
+        <p:style>
+          <a:lnRef idx="2">
+            <a:schemeClr val="accent1">
+              <a:shade val="50000"/>
+            </a:schemeClr>
+          </a:lnRef>
+          <a:fillRef idx="1">
+            <a:schemeClr val="accent1"/>
+          </a:fillRef>
+          <a:effectRef idx="0">
+            <a:schemeClr val="accent1"/>
+          </a:effectRef>
+          <a:fontRef idx="minor">
+            <a:schemeClr val="lt1"/>
+          </a:fontRef>
+        </p:style>
+        <p:txBody>
+          <a:bodyPr rtlCol="0" anchor="ctr"/>
+          <a:lstStyle/>
+          <a:p>
+            <a:pPr algn="ctr"/>
+            <a:endParaRPr lang="en-US"/>
+          </a:p>
+        </p:txBody>
+      </p:sp>
+      <p:sp>
+        <p:nvSpPr>
+          <p:cNvPr id="2" name="Title 1">
+            <a:extLst>
+              <a:ext uri="{FF2B5EF4-FFF2-40B4-BE49-F238E27FC236}">
+                <a16:creationId xmlns:a16="http://schemas.microsoft.com/office/drawing/2014/main" id="{53C5D828-9666-E312-B574-9FE965A7D6BE}"/>
+              </a:ext>
+            </a:extLst>
+          </p:cNvPr>
+          <p:cNvSpPr>
+            <a:spLocks noGrp="1"/>
+          </p:cNvSpPr>
+          <p:nvPr>
+            <p:ph type="title"/>
+          </p:nvPr>
+        </p:nvSpPr>
+        <p:spPr>
+          <a:xfrm>
+            <a:off x="889000" y="1967266"/>
+            <a:ext cx="2865582" cy="2547257"/>
+          </a:xfrm>
+          <a:noFill/>
+        </p:spPr>
+        <p:txBody>
+          <a:bodyPr vert="horz" lIns="91440" tIns="45720" rIns="91440" bIns="45720" rtlCol="0" anchor="ctr">
+            <a:normAutofit/>
+          </a:bodyPr>
+          <a:lstStyle/>
+          <a:p>
+            <a:pPr algn="ctr"/>
+            <a:r>
+              <a:rPr lang="en-US" sz="3600" kern="1200" dirty="0">
+                <a:solidFill>
+                  <a:srgbClr val="FFFFFF"/>
+                </a:solidFill>
+                <a:latin typeface="+mj-lt"/>
+                <a:ea typeface="+mj-ea"/>
+                <a:cs typeface="+mj-cs"/>
+              </a:rPr>
+              <a:t>Azure </a:t>
+            </a:r>
+            <a:r>
+              <a:rPr lang="en-US" sz="3600" dirty="0">
+                <a:solidFill>
+                  <a:srgbClr val="FFFFFF"/>
+                </a:solidFill>
+              </a:rPr>
+              <a:t>Compute – Function App</a:t>
+            </a:r>
+            <a:endParaRPr lang="en-US" sz="3600" kern="1200" dirty="0">
+              <a:solidFill>
+                <a:srgbClr val="FFFFFF"/>
+              </a:solidFill>
+              <a:latin typeface="+mj-lt"/>
+              <a:ea typeface="+mj-ea"/>
+              <a:cs typeface="+mj-cs"/>
+            </a:endParaRPr>
+          </a:p>
+        </p:txBody>
+      </p:sp>
+      <p:sp>
+        <p:nvSpPr>
+          <p:cNvPr id="3" name="Footer Placeholder 2">
+            <a:extLst>
+              <a:ext uri="{FF2B5EF4-FFF2-40B4-BE49-F238E27FC236}">
+                <a16:creationId xmlns:a16="http://schemas.microsoft.com/office/drawing/2014/main" id="{5AA19FA0-A765-8169-03F1-928E3EF7B595}"/>
+              </a:ext>
+            </a:extLst>
+          </p:cNvPr>
+          <p:cNvSpPr>
+            <a:spLocks noGrp="1"/>
+          </p:cNvSpPr>
+          <p:nvPr>
+            <p:ph type="ftr" sz="quarter" idx="11"/>
+          </p:nvPr>
+        </p:nvSpPr>
+        <p:spPr/>
+        <p:txBody>
+          <a:bodyPr/>
+          <a:lstStyle/>
+          <a:p>
+            <a:r>
+              <a:rPr lang="es-ES"/>
+              <a:t>Step 1 - Model - ver. 1</a:t>
+            </a:r>
+            <a:endParaRPr lang="ru-UA"/>
+          </a:p>
+        </p:txBody>
+      </p:sp>
+      <p:sp>
+        <p:nvSpPr>
+          <p:cNvPr id="5" name="Rectangle 4">
+            <a:extLst>
+              <a:ext uri="{FF2B5EF4-FFF2-40B4-BE49-F238E27FC236}">
+                <a16:creationId xmlns:a16="http://schemas.microsoft.com/office/drawing/2014/main" id="{AD5CB6A8-170B-0A95-F7B1-2340F8B4CEF9}"/>
+              </a:ext>
+            </a:extLst>
+          </p:cNvPr>
+          <p:cNvSpPr/>
+          <p:nvPr/>
+        </p:nvSpPr>
+        <p:spPr>
+          <a:xfrm>
+            <a:off x="5375564" y="1574019"/>
+            <a:ext cx="5624945" cy="3333750"/>
+          </a:xfrm>
+          <a:prstGeom prst="rect">
+            <a:avLst/>
+          </a:prstGeom>
+        </p:spPr>
+        <p:style>
+          <a:lnRef idx="2">
+            <a:schemeClr val="accent1">
+              <a:shade val="15000"/>
+            </a:schemeClr>
+          </a:lnRef>
+          <a:fillRef idx="1">
+            <a:schemeClr val="accent1"/>
+          </a:fillRef>
+          <a:effectRef idx="0">
+            <a:schemeClr val="accent1"/>
+          </a:effectRef>
+          <a:fontRef idx="minor">
+            <a:schemeClr val="lt1"/>
+          </a:fontRef>
+        </p:style>
+        <p:txBody>
+          <a:bodyPr rtlCol="0" anchor="ctr"/>
+          <a:lstStyle/>
+          <a:p>
+            <a:pPr algn="ctr"/>
+            <a:endParaRPr lang="ru-UA"/>
+          </a:p>
+        </p:txBody>
+      </p:sp>
+    </p:spTree>
+    <p:extLst>
+      <p:ext uri="{BB962C8B-B14F-4D97-AF65-F5344CB8AC3E}">
+        <p14:creationId xmlns:p14="http://schemas.microsoft.com/office/powerpoint/2010/main" val="246431689"/>
+      </p:ext>
+    </p:extLst>
+  </p:cSld>
+  <p:clrMapOvr>
+    <a:masterClrMapping/>
+  </p:clrMapOvr>
+</p:sld>
+</file>
+
+<file path=ppt/slides/slide34.xml><?xml version="1.0" encoding="utf-8"?>
+<p:sld xmlns:a="http://schemas.openxmlformats.org/drawingml/2006/main" xmlns:r="http://schemas.openxmlformats.org/officeDocument/2006/relationships" xmlns:p="http://schemas.openxmlformats.org/presentationml/2006/main">
+  <p:cSld>
+    <p:bg>
+      <p:bgPr>
+        <a:solidFill>
+          <a:schemeClr val="bg1"/>
+        </a:solidFill>
+        <a:effectLst/>
+      </p:bgPr>
+    </p:bg>
+    <p:spTree>
+      <p:nvGrpSpPr>
+        <p:cNvPr id="1" name=""/>
+        <p:cNvGrpSpPr/>
+        <p:nvPr/>
+      </p:nvGrpSpPr>
+      <p:grpSpPr>
+        <a:xfrm>
+          <a:off x="0" y="0"/>
+          <a:ext cx="0" cy="0"/>
+          <a:chOff x="0" y="0"/>
+          <a:chExt cx="0" cy="0"/>
+        </a:xfrm>
+      </p:grpSpPr>
+      <p:sp>
+        <p:nvSpPr>
+          <p:cNvPr id="24" name="Down Arrow 7">
+            <a:extLst>
+              <a:ext uri="{FF2B5EF4-FFF2-40B4-BE49-F238E27FC236}">
+                <a16:creationId xmlns:a16="http://schemas.microsoft.com/office/drawing/2014/main" id="{D4771268-CB57-404A-9271-370EB28F6090}"/>
+              </a:ext>
+              <a:ext uri="{C183D7F6-B498-43B3-948B-1728B52AA6E4}">
+                <adec:decorative xmlns:adec="http://schemas.microsoft.com/office/drawing/2017/decorative" val="1"/>
+              </a:ext>
+            </a:extLst>
+          </p:cNvPr>
+          <p:cNvSpPr>
+            <a:spLocks noGrp="1" noRot="1" noChangeAspect="1" noMove="1" noResize="1" noEditPoints="1" noAdjustHandles="1" noChangeArrowheads="1" noChangeShapeType="1" noTextEdit="1"/>
+          </p:cNvSpPr>
+          <p:nvPr>
+            <p:extLst>
+              <p:ext uri="{386F3935-93C4-4BCD-93E2-E3B085C9AB24}">
+                <p16:designElem xmlns:p16="http://schemas.microsoft.com/office/powerpoint/2015/main" val="1"/>
+              </p:ext>
+            </p:extLst>
+          </p:nvPr>
+        </p:nvSpPr>
+        <p:spPr>
+          <a:xfrm rot="16200000">
+            <a:off x="800100" y="1491343"/>
+            <a:ext cx="3333749" cy="3499103"/>
+          </a:xfrm>
+          <a:prstGeom prst="downArrow">
+            <a:avLst>
+              <a:gd name="adj1" fmla="val 100000"/>
+              <a:gd name="adj2" fmla="val 15788"/>
+            </a:avLst>
+          </a:prstGeom>
+          <a:solidFill>
+            <a:srgbClr val="404040"/>
+          </a:solidFill>
+          <a:ln w="53975">
+            <a:noFill/>
+          </a:ln>
+        </p:spPr>
+        <p:style>
+          <a:lnRef idx="2">
+            <a:schemeClr val="accent1">
+              <a:shade val="50000"/>
+            </a:schemeClr>
+          </a:lnRef>
+          <a:fillRef idx="1">
+            <a:schemeClr val="accent1"/>
+          </a:fillRef>
+          <a:effectRef idx="0">
+            <a:schemeClr val="accent1"/>
+          </a:effectRef>
+          <a:fontRef idx="minor">
+            <a:schemeClr val="lt1"/>
+          </a:fontRef>
+        </p:style>
+        <p:txBody>
+          <a:bodyPr rtlCol="0" anchor="ctr"/>
+          <a:lstStyle/>
+          <a:p>
+            <a:pPr algn="ctr"/>
+            <a:endParaRPr lang="en-US"/>
+          </a:p>
+        </p:txBody>
+      </p:sp>
+      <p:sp>
+        <p:nvSpPr>
+          <p:cNvPr id="2" name="Title 1">
+            <a:extLst>
+              <a:ext uri="{FF2B5EF4-FFF2-40B4-BE49-F238E27FC236}">
+                <a16:creationId xmlns:a16="http://schemas.microsoft.com/office/drawing/2014/main" id="{53C5D828-9666-E312-B574-9FE965A7D6BE}"/>
+              </a:ext>
+            </a:extLst>
+          </p:cNvPr>
+          <p:cNvSpPr>
+            <a:spLocks noGrp="1"/>
+          </p:cNvSpPr>
+          <p:nvPr>
+            <p:ph type="title"/>
+          </p:nvPr>
+        </p:nvSpPr>
+        <p:spPr>
+          <a:xfrm>
+            <a:off x="889000" y="1967266"/>
+            <a:ext cx="2865582" cy="2547257"/>
+          </a:xfrm>
+          <a:noFill/>
+        </p:spPr>
+        <p:txBody>
+          <a:bodyPr vert="horz" lIns="91440" tIns="45720" rIns="91440" bIns="45720" rtlCol="0" anchor="ctr">
+            <a:normAutofit fontScale="90000"/>
+          </a:bodyPr>
+          <a:lstStyle/>
+          <a:p>
+            <a:pPr algn="ctr"/>
+            <a:r>
+              <a:rPr lang="en-US" sz="3600" kern="1200" dirty="0">
+                <a:solidFill>
+                  <a:srgbClr val="FFFFFF"/>
+                </a:solidFill>
+                <a:latin typeface="+mj-lt"/>
+                <a:ea typeface="+mj-ea"/>
+                <a:cs typeface="+mj-cs"/>
+              </a:rPr>
+              <a:t>Azure </a:t>
+            </a:r>
+            <a:r>
+              <a:rPr lang="en-US" sz="3600" dirty="0">
+                <a:solidFill>
+                  <a:srgbClr val="FFFFFF"/>
+                </a:solidFill>
+              </a:rPr>
+              <a:t>Compute – Azure Container Instances</a:t>
+            </a:r>
+            <a:endParaRPr lang="en-US" sz="3600" kern="1200" dirty="0">
+              <a:solidFill>
+                <a:srgbClr val="FFFFFF"/>
+              </a:solidFill>
+              <a:latin typeface="+mj-lt"/>
+              <a:ea typeface="+mj-ea"/>
+              <a:cs typeface="+mj-cs"/>
+            </a:endParaRPr>
+          </a:p>
+        </p:txBody>
+      </p:sp>
+      <p:sp>
+        <p:nvSpPr>
+          <p:cNvPr id="3" name="Footer Placeholder 2">
+            <a:extLst>
+              <a:ext uri="{FF2B5EF4-FFF2-40B4-BE49-F238E27FC236}">
+                <a16:creationId xmlns:a16="http://schemas.microsoft.com/office/drawing/2014/main" id="{5AA19FA0-A765-8169-03F1-928E3EF7B595}"/>
+              </a:ext>
+            </a:extLst>
+          </p:cNvPr>
+          <p:cNvSpPr>
+            <a:spLocks noGrp="1"/>
+          </p:cNvSpPr>
+          <p:nvPr>
+            <p:ph type="ftr" sz="quarter" idx="11"/>
+          </p:nvPr>
+        </p:nvSpPr>
+        <p:spPr/>
+        <p:txBody>
+          <a:bodyPr/>
+          <a:lstStyle/>
+          <a:p>
+            <a:r>
+              <a:rPr lang="es-ES"/>
+              <a:t>Step 1 - Model - ver. 1</a:t>
+            </a:r>
+            <a:endParaRPr lang="ru-UA"/>
+          </a:p>
+        </p:txBody>
+      </p:sp>
+      <p:sp>
+        <p:nvSpPr>
+          <p:cNvPr id="5" name="Rectangle 4">
+            <a:extLst>
+              <a:ext uri="{FF2B5EF4-FFF2-40B4-BE49-F238E27FC236}">
+                <a16:creationId xmlns:a16="http://schemas.microsoft.com/office/drawing/2014/main" id="{AD5CB6A8-170B-0A95-F7B1-2340F8B4CEF9}"/>
+              </a:ext>
+            </a:extLst>
+          </p:cNvPr>
+          <p:cNvSpPr/>
+          <p:nvPr/>
+        </p:nvSpPr>
+        <p:spPr>
+          <a:xfrm>
+            <a:off x="5375564" y="1574019"/>
+            <a:ext cx="5624945" cy="3333750"/>
+          </a:xfrm>
+          <a:prstGeom prst="rect">
+            <a:avLst/>
+          </a:prstGeom>
+        </p:spPr>
+        <p:style>
+          <a:lnRef idx="2">
+            <a:schemeClr val="accent1">
+              <a:shade val="15000"/>
+            </a:schemeClr>
+          </a:lnRef>
+          <a:fillRef idx="1">
+            <a:schemeClr val="accent1"/>
+          </a:fillRef>
+          <a:effectRef idx="0">
+            <a:schemeClr val="accent1"/>
+          </a:effectRef>
+          <a:fontRef idx="minor">
+            <a:schemeClr val="lt1"/>
+          </a:fontRef>
+        </p:style>
+        <p:txBody>
+          <a:bodyPr rtlCol="0" anchor="ctr"/>
+          <a:lstStyle/>
+          <a:p>
+            <a:pPr algn="ctr"/>
+            <a:endParaRPr lang="ru-UA"/>
+          </a:p>
+        </p:txBody>
+      </p:sp>
+    </p:spTree>
+    <p:extLst>
+      <p:ext uri="{BB962C8B-B14F-4D97-AF65-F5344CB8AC3E}">
+        <p14:creationId xmlns:p14="http://schemas.microsoft.com/office/powerpoint/2010/main" val="3336478611"/>
+      </p:ext>
+    </p:extLst>
+  </p:cSld>
+  <p:clrMapOvr>
+    <a:masterClrMapping/>
+  </p:clrMapOvr>
+</p:sld>
+</file>
+
+<file path=ppt/slides/slide35.xml><?xml version="1.0" encoding="utf-8"?>
+<p:sld xmlns:a="http://schemas.openxmlformats.org/drawingml/2006/main" xmlns:r="http://schemas.openxmlformats.org/officeDocument/2006/relationships" xmlns:p="http://schemas.openxmlformats.org/presentationml/2006/main">
+  <p:cSld>
+    <p:bg>
+      <p:bgPr>
+        <a:solidFill>
+          <a:schemeClr val="bg1"/>
+        </a:solidFill>
+        <a:effectLst/>
+      </p:bgPr>
+    </p:bg>
+    <p:spTree>
+      <p:nvGrpSpPr>
+        <p:cNvPr id="1" name=""/>
+        <p:cNvGrpSpPr/>
+        <p:nvPr/>
+      </p:nvGrpSpPr>
+      <p:grpSpPr>
+        <a:xfrm>
+          <a:off x="0" y="0"/>
+          <a:ext cx="0" cy="0"/>
+          <a:chOff x="0" y="0"/>
+          <a:chExt cx="0" cy="0"/>
+        </a:xfrm>
+      </p:grpSpPr>
+      <p:sp>
+        <p:nvSpPr>
+          <p:cNvPr id="24" name="Down Arrow 7">
+            <a:extLst>
+              <a:ext uri="{FF2B5EF4-FFF2-40B4-BE49-F238E27FC236}">
+                <a16:creationId xmlns:a16="http://schemas.microsoft.com/office/drawing/2014/main" id="{D4771268-CB57-404A-9271-370EB28F6090}"/>
+              </a:ext>
+              <a:ext uri="{C183D7F6-B498-43B3-948B-1728B52AA6E4}">
+                <adec:decorative xmlns:adec="http://schemas.microsoft.com/office/drawing/2017/decorative" val="1"/>
+              </a:ext>
+            </a:extLst>
+          </p:cNvPr>
+          <p:cNvSpPr>
+            <a:spLocks noGrp="1" noRot="1" noChangeAspect="1" noMove="1" noResize="1" noEditPoints="1" noAdjustHandles="1" noChangeArrowheads="1" noChangeShapeType="1" noTextEdit="1"/>
+          </p:cNvSpPr>
+          <p:nvPr>
+            <p:extLst>
+              <p:ext uri="{386F3935-93C4-4BCD-93E2-E3B085C9AB24}">
+                <p16:designElem xmlns:p16="http://schemas.microsoft.com/office/powerpoint/2015/main" val="1"/>
+              </p:ext>
+            </p:extLst>
+          </p:nvPr>
+        </p:nvSpPr>
+        <p:spPr>
+          <a:xfrm rot="16200000">
+            <a:off x="800100" y="1491343"/>
+            <a:ext cx="3333749" cy="3499103"/>
+          </a:xfrm>
+          <a:prstGeom prst="downArrow">
+            <a:avLst>
+              <a:gd name="adj1" fmla="val 100000"/>
+              <a:gd name="adj2" fmla="val 15788"/>
+            </a:avLst>
+          </a:prstGeom>
+          <a:solidFill>
+            <a:srgbClr val="404040"/>
+          </a:solidFill>
+          <a:ln w="53975">
+            <a:noFill/>
+          </a:ln>
+        </p:spPr>
+        <p:style>
+          <a:lnRef idx="2">
+            <a:schemeClr val="accent1">
+              <a:shade val="50000"/>
+            </a:schemeClr>
+          </a:lnRef>
+          <a:fillRef idx="1">
+            <a:schemeClr val="accent1"/>
+          </a:fillRef>
+          <a:effectRef idx="0">
+            <a:schemeClr val="accent1"/>
+          </a:effectRef>
+          <a:fontRef idx="minor">
+            <a:schemeClr val="lt1"/>
+          </a:fontRef>
+        </p:style>
+        <p:txBody>
+          <a:bodyPr rtlCol="0" anchor="ctr"/>
+          <a:lstStyle/>
+          <a:p>
+            <a:pPr algn="ctr"/>
+            <a:endParaRPr lang="en-US"/>
+          </a:p>
+        </p:txBody>
+      </p:sp>
+      <p:sp>
+        <p:nvSpPr>
+          <p:cNvPr id="2" name="Title 1">
+            <a:extLst>
+              <a:ext uri="{FF2B5EF4-FFF2-40B4-BE49-F238E27FC236}">
+                <a16:creationId xmlns:a16="http://schemas.microsoft.com/office/drawing/2014/main" id="{53C5D828-9666-E312-B574-9FE965A7D6BE}"/>
+              </a:ext>
+            </a:extLst>
+          </p:cNvPr>
+          <p:cNvSpPr>
+            <a:spLocks noGrp="1"/>
+          </p:cNvSpPr>
+          <p:nvPr>
+            <p:ph type="title"/>
+          </p:nvPr>
+        </p:nvSpPr>
+        <p:spPr>
+          <a:xfrm>
+            <a:off x="889000" y="1967266"/>
+            <a:ext cx="2865582" cy="2547257"/>
+          </a:xfrm>
+          <a:noFill/>
+        </p:spPr>
+        <p:txBody>
+          <a:bodyPr vert="horz" lIns="91440" tIns="45720" rIns="91440" bIns="45720" rtlCol="0" anchor="ctr">
+            <a:normAutofit/>
+          </a:bodyPr>
+          <a:lstStyle/>
+          <a:p>
+            <a:pPr algn="ctr"/>
+            <a:r>
+              <a:rPr lang="en-US" sz="3600" kern="1200" dirty="0">
+                <a:solidFill>
+                  <a:srgbClr val="FFFFFF"/>
+                </a:solidFill>
+                <a:latin typeface="+mj-lt"/>
+                <a:ea typeface="+mj-ea"/>
+                <a:cs typeface="+mj-cs"/>
+              </a:rPr>
+              <a:t>Azure – Storage Accounts</a:t>
+            </a:r>
+          </a:p>
+        </p:txBody>
+      </p:sp>
+      <p:sp>
+        <p:nvSpPr>
+          <p:cNvPr id="3" name="Footer Placeholder 2">
+            <a:extLst>
+              <a:ext uri="{FF2B5EF4-FFF2-40B4-BE49-F238E27FC236}">
+                <a16:creationId xmlns:a16="http://schemas.microsoft.com/office/drawing/2014/main" id="{5AA19FA0-A765-8169-03F1-928E3EF7B595}"/>
+              </a:ext>
+            </a:extLst>
+          </p:cNvPr>
+          <p:cNvSpPr>
+            <a:spLocks noGrp="1"/>
+          </p:cNvSpPr>
+          <p:nvPr>
+            <p:ph type="ftr" sz="quarter" idx="11"/>
+          </p:nvPr>
+        </p:nvSpPr>
+        <p:spPr/>
+        <p:txBody>
+          <a:bodyPr/>
+          <a:lstStyle/>
+          <a:p>
+            <a:r>
+              <a:rPr lang="es-ES"/>
+              <a:t>Step 1 - Model - ver. 1</a:t>
+            </a:r>
+            <a:endParaRPr lang="ru-UA"/>
+          </a:p>
+        </p:txBody>
+      </p:sp>
+      <p:pic>
+        <p:nvPicPr>
+          <p:cNvPr id="4" name="Picture 3">
+            <a:extLst>
+              <a:ext uri="{FF2B5EF4-FFF2-40B4-BE49-F238E27FC236}">
+                <a16:creationId xmlns:a16="http://schemas.microsoft.com/office/drawing/2014/main" id="{434808D8-9B40-EE3F-5B67-B5C4ECE37F68}"/>
+              </a:ext>
+            </a:extLst>
+          </p:cNvPr>
+          <p:cNvPicPr>
+            <a:picLocks noChangeAspect="1"/>
+          </p:cNvPicPr>
+          <p:nvPr/>
+        </p:nvPicPr>
+        <p:blipFill>
+          <a:blip r:embed="rId2"/>
+          <a:stretch>
+            <a:fillRect/>
+          </a:stretch>
+        </p:blipFill>
+        <p:spPr>
+          <a:xfrm>
+            <a:off x="5199176" y="652700"/>
+            <a:ext cx="5552600" cy="5552600"/>
+          </a:xfrm>
+          <a:prstGeom prst="rect">
+            <a:avLst/>
+          </a:prstGeom>
+        </p:spPr>
+      </p:pic>
+    </p:spTree>
+    <p:extLst>
+      <p:ext uri="{BB962C8B-B14F-4D97-AF65-F5344CB8AC3E}">
+        <p14:creationId xmlns:p14="http://schemas.microsoft.com/office/powerpoint/2010/main" val="4103443897"/>
+      </p:ext>
+    </p:extLst>
+  </p:cSld>
+  <p:clrMapOvr>
+    <a:masterClrMapping/>
+  </p:clrMapOvr>
+</p:sld>
+</file>
+
+<file path=ppt/slides/slide36.xml><?xml version="1.0" encoding="utf-8"?>
+<p:sld xmlns:a="http://schemas.openxmlformats.org/drawingml/2006/main" xmlns:r="http://schemas.openxmlformats.org/officeDocument/2006/relationships" xmlns:p="http://schemas.openxmlformats.org/presentationml/2006/main">
+  <p:cSld>
+    <p:bg>
+      <p:bgPr>
+        <a:solidFill>
+          <a:schemeClr val="bg1"/>
+        </a:solidFill>
+        <a:effectLst/>
+      </p:bgPr>
+    </p:bg>
+    <p:spTree>
+      <p:nvGrpSpPr>
+        <p:cNvPr id="1" name=""/>
+        <p:cNvGrpSpPr/>
+        <p:nvPr/>
+      </p:nvGrpSpPr>
+      <p:grpSpPr>
+        <a:xfrm>
+          <a:off x="0" y="0"/>
+          <a:ext cx="0" cy="0"/>
+          <a:chOff x="0" y="0"/>
+          <a:chExt cx="0" cy="0"/>
+        </a:xfrm>
+      </p:grpSpPr>
+      <p:sp>
+        <p:nvSpPr>
+          <p:cNvPr id="24" name="Down Arrow 7">
+            <a:extLst>
+              <a:ext uri="{FF2B5EF4-FFF2-40B4-BE49-F238E27FC236}">
+                <a16:creationId xmlns:a16="http://schemas.microsoft.com/office/drawing/2014/main" id="{D4771268-CB57-404A-9271-370EB28F6090}"/>
+              </a:ext>
+              <a:ext uri="{C183D7F6-B498-43B3-948B-1728B52AA6E4}">
+                <adec:decorative xmlns:adec="http://schemas.microsoft.com/office/drawing/2017/decorative" val="1"/>
+              </a:ext>
+            </a:extLst>
+          </p:cNvPr>
+          <p:cNvSpPr>
+            <a:spLocks noGrp="1" noRot="1" noChangeAspect="1" noMove="1" noResize="1" noEditPoints="1" noAdjustHandles="1" noChangeArrowheads="1" noChangeShapeType="1" noTextEdit="1"/>
+          </p:cNvSpPr>
+          <p:nvPr>
+            <p:extLst>
+              <p:ext uri="{386F3935-93C4-4BCD-93E2-E3B085C9AB24}">
+                <p16:designElem xmlns:p16="http://schemas.microsoft.com/office/powerpoint/2015/main" val="1"/>
+              </p:ext>
+            </p:extLst>
+          </p:nvPr>
+        </p:nvSpPr>
+        <p:spPr>
+          <a:xfrm rot="16200000">
+            <a:off x="800100" y="1491343"/>
+            <a:ext cx="3333749" cy="3499103"/>
+          </a:xfrm>
+          <a:prstGeom prst="downArrow">
+            <a:avLst>
+              <a:gd name="adj1" fmla="val 100000"/>
+              <a:gd name="adj2" fmla="val 15788"/>
+            </a:avLst>
+          </a:prstGeom>
+          <a:solidFill>
+            <a:srgbClr val="404040"/>
+          </a:solidFill>
+          <a:ln w="53975">
+            <a:noFill/>
+          </a:ln>
+        </p:spPr>
+        <p:style>
+          <a:lnRef idx="2">
+            <a:schemeClr val="accent1">
+              <a:shade val="50000"/>
+            </a:schemeClr>
+          </a:lnRef>
+          <a:fillRef idx="1">
+            <a:schemeClr val="accent1"/>
+          </a:fillRef>
+          <a:effectRef idx="0">
+            <a:schemeClr val="accent1"/>
+          </a:effectRef>
+          <a:fontRef idx="minor">
+            <a:schemeClr val="lt1"/>
+          </a:fontRef>
+        </p:style>
+        <p:txBody>
+          <a:bodyPr rtlCol="0" anchor="ctr"/>
+          <a:lstStyle/>
+          <a:p>
+            <a:pPr algn="ctr"/>
+            <a:endParaRPr lang="en-US"/>
+          </a:p>
+        </p:txBody>
+      </p:sp>
+      <p:sp>
+        <p:nvSpPr>
+          <p:cNvPr id="2" name="Title 1">
+            <a:extLst>
+              <a:ext uri="{FF2B5EF4-FFF2-40B4-BE49-F238E27FC236}">
+                <a16:creationId xmlns:a16="http://schemas.microsoft.com/office/drawing/2014/main" id="{53C5D828-9666-E312-B574-9FE965A7D6BE}"/>
+              </a:ext>
+            </a:extLst>
+          </p:cNvPr>
+          <p:cNvSpPr>
+            <a:spLocks noGrp="1"/>
+          </p:cNvSpPr>
+          <p:nvPr>
+            <p:ph type="title"/>
+          </p:nvPr>
+        </p:nvSpPr>
+        <p:spPr>
+          <a:xfrm>
+            <a:off x="889000" y="1967266"/>
+            <a:ext cx="2865582" cy="2547257"/>
+          </a:xfrm>
+          <a:noFill/>
+        </p:spPr>
+        <p:txBody>
+          <a:bodyPr vert="horz" lIns="91440" tIns="45720" rIns="91440" bIns="45720" rtlCol="0" anchor="ctr">
+            <a:normAutofit/>
+          </a:bodyPr>
+          <a:lstStyle/>
+          <a:p>
+            <a:pPr algn="ctr"/>
+            <a:r>
+              <a:rPr lang="en-US" sz="3600" kern="1200" dirty="0">
+                <a:solidFill>
+                  <a:srgbClr val="FFFFFF"/>
+                </a:solidFill>
+                <a:latin typeface="+mj-lt"/>
+                <a:ea typeface="+mj-ea"/>
+                <a:cs typeface="+mj-cs"/>
+              </a:rPr>
+              <a:t>Azure - Disk Storage</a:t>
+            </a:r>
+          </a:p>
+        </p:txBody>
+      </p:sp>
+      <p:sp>
+        <p:nvSpPr>
+          <p:cNvPr id="3" name="Footer Placeholder 2">
+            <a:extLst>
+              <a:ext uri="{FF2B5EF4-FFF2-40B4-BE49-F238E27FC236}">
+                <a16:creationId xmlns:a16="http://schemas.microsoft.com/office/drawing/2014/main" id="{5AA19FA0-A765-8169-03F1-928E3EF7B595}"/>
+              </a:ext>
+            </a:extLst>
+          </p:cNvPr>
+          <p:cNvSpPr>
+            <a:spLocks noGrp="1"/>
+          </p:cNvSpPr>
+          <p:nvPr>
+            <p:ph type="ftr" sz="quarter" idx="11"/>
+          </p:nvPr>
+        </p:nvSpPr>
+        <p:spPr/>
+        <p:txBody>
+          <a:bodyPr/>
+          <a:lstStyle/>
+          <a:p>
+            <a:r>
+              <a:rPr lang="es-ES"/>
+              <a:t>Step 1 - Model - ver. 1</a:t>
+            </a:r>
+            <a:endParaRPr lang="ru-UA"/>
+          </a:p>
+        </p:txBody>
+      </p:sp>
+      <p:pic>
+        <p:nvPicPr>
+          <p:cNvPr id="5" name="Picture 4">
+            <a:extLst>
+              <a:ext uri="{FF2B5EF4-FFF2-40B4-BE49-F238E27FC236}">
+                <a16:creationId xmlns:a16="http://schemas.microsoft.com/office/drawing/2014/main" id="{59EC6999-954D-E7E0-8D23-E784949428CB}"/>
+              </a:ext>
+            </a:extLst>
+          </p:cNvPr>
+          <p:cNvPicPr>
+            <a:picLocks noChangeAspect="1"/>
+          </p:cNvPicPr>
+          <p:nvPr/>
+        </p:nvPicPr>
+        <p:blipFill>
+          <a:blip r:embed="rId2"/>
+          <a:stretch>
+            <a:fillRect/>
+          </a:stretch>
+        </p:blipFill>
+        <p:spPr>
+          <a:xfrm>
+            <a:off x="4832226" y="1574019"/>
+            <a:ext cx="6286500" cy="3581400"/>
+          </a:xfrm>
+          <a:prstGeom prst="rect">
+            <a:avLst/>
+          </a:prstGeom>
+        </p:spPr>
+      </p:pic>
+    </p:spTree>
+    <p:extLst>
+      <p:ext uri="{BB962C8B-B14F-4D97-AF65-F5344CB8AC3E}">
+        <p14:creationId xmlns:p14="http://schemas.microsoft.com/office/powerpoint/2010/main" val="3743280714"/>
+      </p:ext>
+    </p:extLst>
+  </p:cSld>
+  <p:clrMapOvr>
+    <a:masterClrMapping/>
+  </p:clrMapOvr>
+</p:sld>
+</file>
+
+<file path=ppt/slides/slide37.xml><?xml version="1.0" encoding="utf-8"?>
+<p:sld xmlns:a="http://schemas.openxmlformats.org/drawingml/2006/main" xmlns:r="http://schemas.openxmlformats.org/officeDocument/2006/relationships" xmlns:p="http://schemas.openxmlformats.org/presentationml/2006/main">
+  <p:cSld>
+    <p:bg>
+      <p:bgPr>
+        <a:solidFill>
+          <a:schemeClr val="bg1"/>
+        </a:solidFill>
+        <a:effectLst/>
+      </p:bgPr>
+    </p:bg>
+    <p:spTree>
+      <p:nvGrpSpPr>
+        <p:cNvPr id="1" name=""/>
+        <p:cNvGrpSpPr/>
+        <p:nvPr/>
+      </p:nvGrpSpPr>
+      <p:grpSpPr>
+        <a:xfrm>
+          <a:off x="0" y="0"/>
+          <a:ext cx="0" cy="0"/>
+          <a:chOff x="0" y="0"/>
+          <a:chExt cx="0" cy="0"/>
+        </a:xfrm>
+      </p:grpSpPr>
+      <p:sp>
+        <p:nvSpPr>
+          <p:cNvPr id="24" name="Down Arrow 7">
+            <a:extLst>
+              <a:ext uri="{FF2B5EF4-FFF2-40B4-BE49-F238E27FC236}">
+                <a16:creationId xmlns:a16="http://schemas.microsoft.com/office/drawing/2014/main" id="{D4771268-CB57-404A-9271-370EB28F6090}"/>
+              </a:ext>
+              <a:ext uri="{C183D7F6-B498-43B3-948B-1728B52AA6E4}">
+                <adec:decorative xmlns:adec="http://schemas.microsoft.com/office/drawing/2017/decorative" val="1"/>
+              </a:ext>
+            </a:extLst>
+          </p:cNvPr>
+          <p:cNvSpPr>
+            <a:spLocks noGrp="1" noRot="1" noChangeAspect="1" noMove="1" noResize="1" noEditPoints="1" noAdjustHandles="1" noChangeArrowheads="1" noChangeShapeType="1" noTextEdit="1"/>
+          </p:cNvSpPr>
+          <p:nvPr>
+            <p:extLst>
+              <p:ext uri="{386F3935-93C4-4BCD-93E2-E3B085C9AB24}">
+                <p16:designElem xmlns:p16="http://schemas.microsoft.com/office/powerpoint/2015/main" val="1"/>
+              </p:ext>
+            </p:extLst>
+          </p:nvPr>
+        </p:nvSpPr>
+        <p:spPr>
+          <a:xfrm rot="16200000">
+            <a:off x="800100" y="1491343"/>
+            <a:ext cx="3333749" cy="3499103"/>
+          </a:xfrm>
+          <a:prstGeom prst="downArrow">
+            <a:avLst>
+              <a:gd name="adj1" fmla="val 100000"/>
+              <a:gd name="adj2" fmla="val 15788"/>
+            </a:avLst>
+          </a:prstGeom>
+          <a:solidFill>
+            <a:srgbClr val="404040"/>
+          </a:solidFill>
+          <a:ln w="53975">
+            <a:noFill/>
+          </a:ln>
+        </p:spPr>
+        <p:style>
+          <a:lnRef idx="2">
+            <a:schemeClr val="accent1">
+              <a:shade val="50000"/>
+            </a:schemeClr>
+          </a:lnRef>
+          <a:fillRef idx="1">
+            <a:schemeClr val="accent1"/>
+          </a:fillRef>
+          <a:effectRef idx="0">
+            <a:schemeClr val="accent1"/>
+          </a:effectRef>
+          <a:fontRef idx="minor">
+            <a:schemeClr val="lt1"/>
+          </a:fontRef>
+        </p:style>
+        <p:txBody>
+          <a:bodyPr rtlCol="0" anchor="ctr"/>
+          <a:lstStyle/>
+          <a:p>
+            <a:pPr algn="ctr"/>
+            <a:endParaRPr lang="en-US"/>
+          </a:p>
+        </p:txBody>
+      </p:sp>
+      <p:sp>
+        <p:nvSpPr>
+          <p:cNvPr id="2" name="Title 1">
+            <a:extLst>
+              <a:ext uri="{FF2B5EF4-FFF2-40B4-BE49-F238E27FC236}">
+                <a16:creationId xmlns:a16="http://schemas.microsoft.com/office/drawing/2014/main" id="{53C5D828-9666-E312-B574-9FE965A7D6BE}"/>
+              </a:ext>
+            </a:extLst>
+          </p:cNvPr>
+          <p:cNvSpPr>
+            <a:spLocks noGrp="1"/>
+          </p:cNvSpPr>
+          <p:nvPr>
+            <p:ph type="title"/>
+          </p:nvPr>
+        </p:nvSpPr>
+        <p:spPr>
+          <a:xfrm>
+            <a:off x="889000" y="1967266"/>
+            <a:ext cx="2865582" cy="2547257"/>
+          </a:xfrm>
+          <a:noFill/>
+        </p:spPr>
+        <p:txBody>
+          <a:bodyPr vert="horz" lIns="91440" tIns="45720" rIns="91440" bIns="45720" rtlCol="0" anchor="ctr">
+            <a:normAutofit/>
+          </a:bodyPr>
+          <a:lstStyle/>
+          <a:p>
+            <a:pPr algn="ctr"/>
+            <a:r>
+              <a:rPr lang="en-US" sz="3600" kern="1200" dirty="0">
+                <a:solidFill>
+                  <a:srgbClr val="FFFFFF"/>
+                </a:solidFill>
+                <a:latin typeface="+mj-lt"/>
+                <a:ea typeface="+mj-ea"/>
+                <a:cs typeface="+mj-cs"/>
+              </a:rPr>
+              <a:t>Azure – </a:t>
+            </a:r>
+            <a:r>
+              <a:rPr lang="en-US" sz="3600" dirty="0">
+                <a:solidFill>
+                  <a:srgbClr val="FFFFFF"/>
+                </a:solidFill>
+              </a:rPr>
+              <a:t>Virtual Network</a:t>
+            </a:r>
+            <a:endParaRPr lang="en-US" sz="3600" kern="1200" dirty="0">
+              <a:solidFill>
+                <a:srgbClr val="FFFFFF"/>
+              </a:solidFill>
+              <a:latin typeface="+mj-lt"/>
+              <a:ea typeface="+mj-ea"/>
+              <a:cs typeface="+mj-cs"/>
+            </a:endParaRPr>
+          </a:p>
+        </p:txBody>
+      </p:sp>
+      <p:sp>
+        <p:nvSpPr>
+          <p:cNvPr id="3" name="Footer Placeholder 2">
+            <a:extLst>
+              <a:ext uri="{FF2B5EF4-FFF2-40B4-BE49-F238E27FC236}">
+                <a16:creationId xmlns:a16="http://schemas.microsoft.com/office/drawing/2014/main" id="{5AA19FA0-A765-8169-03F1-928E3EF7B595}"/>
+              </a:ext>
+            </a:extLst>
+          </p:cNvPr>
+          <p:cNvSpPr>
+            <a:spLocks noGrp="1"/>
+          </p:cNvSpPr>
+          <p:nvPr>
+            <p:ph type="ftr" sz="quarter" idx="11"/>
+          </p:nvPr>
+        </p:nvSpPr>
+        <p:spPr/>
+        <p:txBody>
+          <a:bodyPr/>
+          <a:lstStyle/>
+          <a:p>
+            <a:r>
+              <a:rPr lang="es-ES"/>
+              <a:t>Step 1 - Model - ver. 1</a:t>
+            </a:r>
+            <a:endParaRPr lang="ru-UA"/>
+          </a:p>
+        </p:txBody>
+      </p:sp>
+      <p:pic>
+        <p:nvPicPr>
+          <p:cNvPr id="4" name="Picture 3">
+            <a:extLst>
+              <a:ext uri="{FF2B5EF4-FFF2-40B4-BE49-F238E27FC236}">
+                <a16:creationId xmlns:a16="http://schemas.microsoft.com/office/drawing/2014/main" id="{2F1F014F-1E04-C6CB-13FB-8D68B70132ED}"/>
+              </a:ext>
+            </a:extLst>
+          </p:cNvPr>
+          <p:cNvPicPr>
+            <a:picLocks noChangeAspect="1"/>
+          </p:cNvPicPr>
+          <p:nvPr/>
+        </p:nvPicPr>
+        <p:blipFill>
+          <a:blip r:embed="rId2"/>
+          <a:stretch>
+            <a:fillRect/>
+          </a:stretch>
+        </p:blipFill>
+        <p:spPr>
+          <a:xfrm>
+            <a:off x="5491596" y="1287650"/>
+            <a:ext cx="4552949" cy="4507420"/>
+          </a:xfrm>
+          <a:prstGeom prst="rect">
+            <a:avLst/>
+          </a:prstGeom>
+        </p:spPr>
+      </p:pic>
+    </p:spTree>
+    <p:extLst>
+      <p:ext uri="{BB962C8B-B14F-4D97-AF65-F5344CB8AC3E}">
+        <p14:creationId xmlns:p14="http://schemas.microsoft.com/office/powerpoint/2010/main" val="3674171182"/>
+      </p:ext>
+    </p:extLst>
+  </p:cSld>
+  <p:clrMapOvr>
+    <a:masterClrMapping/>
+  </p:clrMapOvr>
+</p:sld>
+</file>
+
 <file path=ppt/slides/slide4.xml><?xml version="1.0" encoding="utf-8"?>
 <p:sld xmlns:a="http://schemas.openxmlformats.org/drawingml/2006/main" xmlns:r="http://schemas.openxmlformats.org/officeDocument/2006/relationships" xmlns:p="http://schemas.openxmlformats.org/presentationml/2006/main">
   <p:cSld>

</xml_diff>

<commit_message>
Step 4. Cloud Platform: - To Review
</commit_message>
<xml_diff>
--- a/Step04-Cloud_Platforms_presentation.pptx
+++ b/Step04-Cloud_Platforms_presentation.pptx
@@ -6,7 +6,7 @@
     <p:sldMasterId id="2147483648" r:id="rId2"/>
   </p:sldMasterIdLst>
   <p:notesMasterIdLst>
-    <p:notesMasterId r:id="rId40"/>
+    <p:notesMasterId r:id="rId45"/>
   </p:notesMasterIdLst>
   <p:sldIdLst>
     <p:sldId id="302" r:id="rId3"/>
@@ -46,6 +46,11 @@
     <p:sldId id="334" r:id="rId37"/>
     <p:sldId id="335" r:id="rId38"/>
     <p:sldId id="336" r:id="rId39"/>
+    <p:sldId id="337" r:id="rId40"/>
+    <p:sldId id="338" r:id="rId41"/>
+    <p:sldId id="339" r:id="rId42"/>
+    <p:sldId id="340" r:id="rId43"/>
+    <p:sldId id="341" r:id="rId44"/>
   </p:sldIdLst>
   <p:sldSz cx="12192000" cy="6858000"/>
   <p:notesSz cx="6858000" cy="9144000"/>
@@ -198,6 +203,11 @@
             <p14:sldId id="334"/>
             <p14:sldId id="335"/>
             <p14:sldId id="336"/>
+            <p14:sldId id="337"/>
+            <p14:sldId id="338"/>
+            <p14:sldId id="339"/>
+            <p14:sldId id="340"/>
+            <p14:sldId id="341"/>
           </p14:sldIdLst>
         </p14:section>
       </p14:sectionLst>
@@ -212,7 +222,7 @@
 <file path=ppt/revisionInfo.xml><?xml version="1.0" encoding="utf-8"?>
 <p1510:revInfo xmlns:a="http://schemas.openxmlformats.org/drawingml/2006/main" xmlns:r="http://schemas.openxmlformats.org/officeDocument/2006/relationships" xmlns:p1510="http://schemas.microsoft.com/office/powerpoint/2015/10/main">
   <p1510:revLst>
-    <p1510:client id="{1BA64282-8772-44DD-ADE1-6DE4E20DF9D4}" v="19" dt="2024-01-30T17:06:06.324"/>
+    <p1510:client id="{1BA64282-8772-44DD-ADE1-6DE4E20DF9D4}" v="54" dt="2024-01-31T08:21:47.738"/>
   </p1510:revLst>
 </p1510:revInfo>
 </file>
@@ -1444,7 +1454,7 @@
   <pc:docChgLst>
     <pc:chgData name="Ihor Aleksandrov" userId="c3051032-6b87-4db2-b257-777a0106fbd9" providerId="ADAL" clId="{1BA64282-8772-44DD-ADE1-6DE4E20DF9D4}"/>
     <pc:docChg chg="undo custSel addSld delSld modSld sldOrd addSection delSection modSection">
-      <pc:chgData name="Ihor Aleksandrov" userId="c3051032-6b87-4db2-b257-777a0106fbd9" providerId="ADAL" clId="{1BA64282-8772-44DD-ADE1-6DE4E20DF9D4}" dt="2024-01-30T17:07:42.640" v="501" actId="2890"/>
+      <pc:chgData name="Ihor Aleksandrov" userId="c3051032-6b87-4db2-b257-777a0106fbd9" providerId="ADAL" clId="{1BA64282-8772-44DD-ADE1-6DE4E20DF9D4}" dt="2024-01-31T08:21:19.563" v="583" actId="14100"/>
       <pc:docMkLst>
         <pc:docMk/>
       </pc:docMkLst>
@@ -1508,6 +1518,21 @@
             <ac:spMk id="2" creationId="{5DF8ECE0-DBF5-C309-B35B-C6A0C6C847B2}"/>
           </ac:spMkLst>
         </pc:spChg>
+      </pc:sldChg>
+      <pc:sldChg chg="modSp mod">
+        <pc:chgData name="Ihor Aleksandrov" userId="c3051032-6b87-4db2-b257-777a0106fbd9" providerId="ADAL" clId="{1BA64282-8772-44DD-ADE1-6DE4E20DF9D4}" dt="2024-01-31T08:21:19.563" v="583" actId="14100"/>
+        <pc:sldMkLst>
+          <pc:docMk/>
+          <pc:sldMk cId="2972731808" sldId="303"/>
+        </pc:sldMkLst>
+        <pc:graphicFrameChg chg="mod">
+          <ac:chgData name="Ihor Aleksandrov" userId="c3051032-6b87-4db2-b257-777a0106fbd9" providerId="ADAL" clId="{1BA64282-8772-44DD-ADE1-6DE4E20DF9D4}" dt="2024-01-31T08:21:19.563" v="583" actId="14100"/>
+          <ac:graphicFrameMkLst>
+            <pc:docMk/>
+            <pc:sldMk cId="2972731808" sldId="303"/>
+            <ac:graphicFrameMk id="50" creationId="{438840ED-2B50-ED19-12CF-99B1789AE150}"/>
+          </ac:graphicFrameMkLst>
+        </pc:graphicFrameChg>
       </pc:sldChg>
       <pc:sldChg chg="del">
         <pc:chgData name="Ihor Aleksandrov" userId="c3051032-6b87-4db2-b257-777a0106fbd9" providerId="ADAL" clId="{1BA64282-8772-44DD-ADE1-6DE4E20DF9D4}" dt="2024-01-30T10:31:44.289" v="31" actId="47"/>
@@ -2520,12 +2545,175 @@
           </ac:picMkLst>
         </pc:picChg>
       </pc:sldChg>
+      <pc:sldChg chg="addSp delSp modSp add mod">
+        <pc:chgData name="Ihor Aleksandrov" userId="c3051032-6b87-4db2-b257-777a0106fbd9" providerId="ADAL" clId="{1BA64282-8772-44DD-ADE1-6DE4E20DF9D4}" dt="2024-01-31T08:01:55.392" v="512"/>
+        <pc:sldMkLst>
+          <pc:docMk/>
+          <pc:sldMk cId="1296882423" sldId="337"/>
+        </pc:sldMkLst>
+        <pc:spChg chg="mod">
+          <ac:chgData name="Ihor Aleksandrov" userId="c3051032-6b87-4db2-b257-777a0106fbd9" providerId="ADAL" clId="{1BA64282-8772-44DD-ADE1-6DE4E20DF9D4}" dt="2024-01-31T08:01:55.392" v="512"/>
+          <ac:spMkLst>
+            <pc:docMk/>
+            <pc:sldMk cId="1296882423" sldId="337"/>
+            <ac:spMk id="2" creationId="{53C5D828-9666-E312-B574-9FE965A7D6BE}"/>
+          </ac:spMkLst>
+        </pc:spChg>
+        <pc:picChg chg="del">
+          <ac:chgData name="Ihor Aleksandrov" userId="c3051032-6b87-4db2-b257-777a0106fbd9" providerId="ADAL" clId="{1BA64282-8772-44DD-ADE1-6DE4E20DF9D4}" dt="2024-01-31T08:01:13.863" v="503" actId="478"/>
+          <ac:picMkLst>
+            <pc:docMk/>
+            <pc:sldMk cId="1296882423" sldId="337"/>
+            <ac:picMk id="4" creationId="{2F1F014F-1E04-C6CB-13FB-8D68B70132ED}"/>
+          </ac:picMkLst>
+        </pc:picChg>
+        <pc:picChg chg="add mod">
+          <ac:chgData name="Ihor Aleksandrov" userId="c3051032-6b87-4db2-b257-777a0106fbd9" providerId="ADAL" clId="{1BA64282-8772-44DD-ADE1-6DE4E20DF9D4}" dt="2024-01-31T08:01:29.743" v="511" actId="14100"/>
+          <ac:picMkLst>
+            <pc:docMk/>
+            <pc:sldMk cId="1296882423" sldId="337"/>
+            <ac:picMk id="6" creationId="{50977CD2-8BCA-7C85-386A-DB7981EA0615}"/>
+          </ac:picMkLst>
+        </pc:picChg>
+      </pc:sldChg>
       <pc:sldChg chg="add del">
         <pc:chgData name="Ihor Aleksandrov" userId="c3051032-6b87-4db2-b257-777a0106fbd9" providerId="ADAL" clId="{1BA64282-8772-44DD-ADE1-6DE4E20DF9D4}" dt="2024-01-30T17:07:42.640" v="501" actId="2890"/>
         <pc:sldMkLst>
           <pc:docMk/>
           <pc:sldMk cId="2477819659" sldId="337"/>
         </pc:sldMkLst>
+      </pc:sldChg>
+      <pc:sldChg chg="addSp delSp modSp add mod">
+        <pc:chgData name="Ihor Aleksandrov" userId="c3051032-6b87-4db2-b257-777a0106fbd9" providerId="ADAL" clId="{1BA64282-8772-44DD-ADE1-6DE4E20DF9D4}" dt="2024-01-31T08:06:00.433" v="522"/>
+        <pc:sldMkLst>
+          <pc:docMk/>
+          <pc:sldMk cId="2578212810" sldId="338"/>
+        </pc:sldMkLst>
+        <pc:spChg chg="mod">
+          <ac:chgData name="Ihor Aleksandrov" userId="c3051032-6b87-4db2-b257-777a0106fbd9" providerId="ADAL" clId="{1BA64282-8772-44DD-ADE1-6DE4E20DF9D4}" dt="2024-01-31T08:06:00.433" v="522"/>
+          <ac:spMkLst>
+            <pc:docMk/>
+            <pc:sldMk cId="2578212810" sldId="338"/>
+            <ac:spMk id="2" creationId="{53C5D828-9666-E312-B574-9FE965A7D6BE}"/>
+          </ac:spMkLst>
+        </pc:spChg>
+        <pc:picChg chg="add del mod">
+          <ac:chgData name="Ihor Aleksandrov" userId="c3051032-6b87-4db2-b257-777a0106fbd9" providerId="ADAL" clId="{1BA64282-8772-44DD-ADE1-6DE4E20DF9D4}" dt="2024-01-31T08:05:39.704" v="517" actId="478"/>
+          <ac:picMkLst>
+            <pc:docMk/>
+            <pc:sldMk cId="2578212810" sldId="338"/>
+            <ac:picMk id="4" creationId="{C11AD57A-3FA2-3A08-563F-CE435106A27B}"/>
+          </ac:picMkLst>
+        </pc:picChg>
+        <pc:picChg chg="add mod">
+          <ac:chgData name="Ihor Aleksandrov" userId="c3051032-6b87-4db2-b257-777a0106fbd9" providerId="ADAL" clId="{1BA64282-8772-44DD-ADE1-6DE4E20DF9D4}" dt="2024-01-31T08:05:44.989" v="519" actId="1076"/>
+          <ac:picMkLst>
+            <pc:docMk/>
+            <pc:sldMk cId="2578212810" sldId="338"/>
+            <ac:picMk id="5" creationId="{3909FDCD-7A4B-E5C6-1FC1-DA89E6608C59}"/>
+          </ac:picMkLst>
+        </pc:picChg>
+        <pc:picChg chg="del">
+          <ac:chgData name="Ihor Aleksandrov" userId="c3051032-6b87-4db2-b257-777a0106fbd9" providerId="ADAL" clId="{1BA64282-8772-44DD-ADE1-6DE4E20DF9D4}" dt="2024-01-31T08:05:22.619" v="514" actId="478"/>
+          <ac:picMkLst>
+            <pc:docMk/>
+            <pc:sldMk cId="2578212810" sldId="338"/>
+            <ac:picMk id="6" creationId="{50977CD2-8BCA-7C85-386A-DB7981EA0615}"/>
+          </ac:picMkLst>
+        </pc:picChg>
+      </pc:sldChg>
+      <pc:sldChg chg="addSp delSp modSp add mod">
+        <pc:chgData name="Ihor Aleksandrov" userId="c3051032-6b87-4db2-b257-777a0106fbd9" providerId="ADAL" clId="{1BA64282-8772-44DD-ADE1-6DE4E20DF9D4}" dt="2024-01-31T08:11:16.836" v="534" actId="1076"/>
+        <pc:sldMkLst>
+          <pc:docMk/>
+          <pc:sldMk cId="1227530818" sldId="339"/>
+        </pc:sldMkLst>
+        <pc:spChg chg="mod">
+          <ac:chgData name="Ihor Aleksandrov" userId="c3051032-6b87-4db2-b257-777a0106fbd9" providerId="ADAL" clId="{1BA64282-8772-44DD-ADE1-6DE4E20DF9D4}" dt="2024-01-31T08:10:58.757" v="530" actId="20577"/>
+          <ac:spMkLst>
+            <pc:docMk/>
+            <pc:sldMk cId="1227530818" sldId="339"/>
+            <ac:spMk id="2" creationId="{53C5D828-9666-E312-B574-9FE965A7D6BE}"/>
+          </ac:spMkLst>
+        </pc:spChg>
+        <pc:picChg chg="add mod">
+          <ac:chgData name="Ihor Aleksandrov" userId="c3051032-6b87-4db2-b257-777a0106fbd9" providerId="ADAL" clId="{1BA64282-8772-44DD-ADE1-6DE4E20DF9D4}" dt="2024-01-31T08:11:16.836" v="534" actId="1076"/>
+          <ac:picMkLst>
+            <pc:docMk/>
+            <pc:sldMk cId="1227530818" sldId="339"/>
+            <ac:picMk id="4" creationId="{28F107C1-9081-8DFF-32B6-95CB69F19DC1}"/>
+          </ac:picMkLst>
+        </pc:picChg>
+        <pc:picChg chg="del">
+          <ac:chgData name="Ihor Aleksandrov" userId="c3051032-6b87-4db2-b257-777a0106fbd9" providerId="ADAL" clId="{1BA64282-8772-44DD-ADE1-6DE4E20DF9D4}" dt="2024-01-31T08:11:02.695" v="531" actId="478"/>
+          <ac:picMkLst>
+            <pc:docMk/>
+            <pc:sldMk cId="1227530818" sldId="339"/>
+            <ac:picMk id="5" creationId="{3909FDCD-7A4B-E5C6-1FC1-DA89E6608C59}"/>
+          </ac:picMkLst>
+        </pc:picChg>
+      </pc:sldChg>
+      <pc:sldChg chg="addSp delSp modSp add mod">
+        <pc:chgData name="Ihor Aleksandrov" userId="c3051032-6b87-4db2-b257-777a0106fbd9" providerId="ADAL" clId="{1BA64282-8772-44DD-ADE1-6DE4E20DF9D4}" dt="2024-01-31T08:15:07.498" v="547" actId="1076"/>
+        <pc:sldMkLst>
+          <pc:docMk/>
+          <pc:sldMk cId="3182037683" sldId="340"/>
+        </pc:sldMkLst>
+        <pc:spChg chg="mod">
+          <ac:chgData name="Ihor Aleksandrov" userId="c3051032-6b87-4db2-b257-777a0106fbd9" providerId="ADAL" clId="{1BA64282-8772-44DD-ADE1-6DE4E20DF9D4}" dt="2024-01-31T08:14:42.273" v="541"/>
+          <ac:spMkLst>
+            <pc:docMk/>
+            <pc:sldMk cId="3182037683" sldId="340"/>
+            <ac:spMk id="2" creationId="{53C5D828-9666-E312-B574-9FE965A7D6BE}"/>
+          </ac:spMkLst>
+        </pc:spChg>
+        <pc:picChg chg="del">
+          <ac:chgData name="Ihor Aleksandrov" userId="c3051032-6b87-4db2-b257-777a0106fbd9" providerId="ADAL" clId="{1BA64282-8772-44DD-ADE1-6DE4E20DF9D4}" dt="2024-01-31T08:14:44.491" v="542" actId="478"/>
+          <ac:picMkLst>
+            <pc:docMk/>
+            <pc:sldMk cId="3182037683" sldId="340"/>
+            <ac:picMk id="4" creationId="{28F107C1-9081-8DFF-32B6-95CB69F19DC1}"/>
+          </ac:picMkLst>
+        </pc:picChg>
+        <pc:picChg chg="add mod">
+          <ac:chgData name="Ihor Aleksandrov" userId="c3051032-6b87-4db2-b257-777a0106fbd9" providerId="ADAL" clId="{1BA64282-8772-44DD-ADE1-6DE4E20DF9D4}" dt="2024-01-31T08:15:07.498" v="547" actId="1076"/>
+          <ac:picMkLst>
+            <pc:docMk/>
+            <pc:sldMk cId="3182037683" sldId="340"/>
+            <ac:picMk id="5" creationId="{1E6DB63B-EC74-3639-FEE4-934B615E45D7}"/>
+          </ac:picMkLst>
+        </pc:picChg>
+      </pc:sldChg>
+      <pc:sldChg chg="addSp delSp modSp add mod">
+        <pc:chgData name="Ihor Aleksandrov" userId="c3051032-6b87-4db2-b257-777a0106fbd9" providerId="ADAL" clId="{1BA64282-8772-44DD-ADE1-6DE4E20DF9D4}" dt="2024-01-31T08:17:35.252" v="556" actId="1076"/>
+        <pc:sldMkLst>
+          <pc:docMk/>
+          <pc:sldMk cId="960138513" sldId="341"/>
+        </pc:sldMkLst>
+        <pc:spChg chg="mod">
+          <ac:chgData name="Ihor Aleksandrov" userId="c3051032-6b87-4db2-b257-777a0106fbd9" providerId="ADAL" clId="{1BA64282-8772-44DD-ADE1-6DE4E20DF9D4}" dt="2024-01-31T08:17:13.982" v="551"/>
+          <ac:spMkLst>
+            <pc:docMk/>
+            <pc:sldMk cId="960138513" sldId="341"/>
+            <ac:spMk id="2" creationId="{53C5D828-9666-E312-B574-9FE965A7D6BE}"/>
+          </ac:spMkLst>
+        </pc:spChg>
+        <pc:picChg chg="add mod">
+          <ac:chgData name="Ihor Aleksandrov" userId="c3051032-6b87-4db2-b257-777a0106fbd9" providerId="ADAL" clId="{1BA64282-8772-44DD-ADE1-6DE4E20DF9D4}" dt="2024-01-31T08:17:35.252" v="556" actId="1076"/>
+          <ac:picMkLst>
+            <pc:docMk/>
+            <pc:sldMk cId="960138513" sldId="341"/>
+            <ac:picMk id="4" creationId="{D70C559A-B513-CDBF-7D13-F0CDDD4A9E3B}"/>
+          </ac:picMkLst>
+        </pc:picChg>
+        <pc:picChg chg="del">
+          <ac:chgData name="Ihor Aleksandrov" userId="c3051032-6b87-4db2-b257-777a0106fbd9" providerId="ADAL" clId="{1BA64282-8772-44DD-ADE1-6DE4E20DF9D4}" dt="2024-01-31T08:17:26.440" v="552" actId="478"/>
+          <ac:picMkLst>
+            <pc:docMk/>
+            <pc:sldMk cId="960138513" sldId="341"/>
+            <ac:picMk id="5" creationId="{1E6DB63B-EC74-3639-FEE4-934B615E45D7}"/>
+          </ac:picMkLst>
+        </pc:picChg>
       </pc:sldChg>
     </pc:docChg>
   </pc:docChgLst>
@@ -4829,7 +5017,7 @@
         <a:p>
           <a:r>
             <a:rPr lang="en-US" dirty="0"/>
-            <a:t>GitHub DevOps</a:t>
+            <a:t>Cloud Computing</a:t>
           </a:r>
         </a:p>
       </dgm:t>
@@ -4872,7 +5060,7 @@
         <a:p>
           <a:r>
             <a:rPr lang="en-US" dirty="0"/>
-            <a:t>Azure DevOps</a:t>
+            <a:t>AWS</a:t>
           </a:r>
         </a:p>
       </dgm:t>
@@ -4906,6 +5094,49 @@
         </a:p>
       </dgm:t>
     </dgm:pt>
+    <dgm:pt modelId="{2B7ED56E-EBC9-461A-8FD4-163FA2169B7C}">
+      <dgm:prSet/>
+      <dgm:spPr/>
+      <dgm:t>
+        <a:bodyPr/>
+        <a:lstStyle/>
+        <a:p>
+          <a:r>
+            <a:rPr lang="en-US" dirty="0"/>
+            <a:t>Azure</a:t>
+          </a:r>
+        </a:p>
+      </dgm:t>
+      <dgm:extLst>
+        <a:ext uri="{E40237B7-FDA0-4F09-8148-C483321AD2D9}">
+          <dgm14:cNvPr xmlns:dgm14="http://schemas.microsoft.com/office/drawing/2010/diagram" id="0" name="">
+            <a:hlinkClick xmlns:r="http://schemas.openxmlformats.org/officeDocument/2006/relationships" r:id="rId3" action="ppaction://hlinksldjump"/>
+          </dgm14:cNvPr>
+        </a:ext>
+      </dgm:extLst>
+    </dgm:pt>
+    <dgm:pt modelId="{C71D7821-CC2C-4ED6-BFBE-FAE3CC2E8DA1}" type="parTrans" cxnId="{BF555944-BDA0-488C-8626-E7431C0B2A69}">
+      <dgm:prSet/>
+      <dgm:spPr/>
+      <dgm:t>
+        <a:bodyPr/>
+        <a:lstStyle/>
+        <a:p>
+          <a:endParaRPr lang="ru-UA"/>
+        </a:p>
+      </dgm:t>
+    </dgm:pt>
+    <dgm:pt modelId="{CD9A4AA0-7D39-41C7-9C1A-118ECBD08BD8}" type="sibTrans" cxnId="{BF555944-BDA0-488C-8626-E7431C0B2A69}">
+      <dgm:prSet/>
+      <dgm:spPr/>
+      <dgm:t>
+        <a:bodyPr/>
+        <a:lstStyle/>
+        <a:p>
+          <a:endParaRPr lang="ru-UA"/>
+        </a:p>
+      </dgm:t>
+    </dgm:pt>
     <dgm:pt modelId="{76D6B6BC-F8F0-4466-930A-673E438AD175}" type="pres">
       <dgm:prSet presAssocID="{1C600E66-A0CB-470F-8514-C91590285CB3}" presName="Name0" presStyleCnt="0">
         <dgm:presLayoutVars>
@@ -4921,7 +5152,7 @@
       <dgm:spPr/>
     </dgm:pt>
     <dgm:pt modelId="{FF5931E5-6577-45BF-AE5E-698950A6CB7C}" type="pres">
-      <dgm:prSet presAssocID="{64E9ACE6-9AFD-4BBA-80CB-01DA1300E087}" presName="parentText" presStyleLbl="node1" presStyleIdx="0" presStyleCnt="2">
+      <dgm:prSet presAssocID="{64E9ACE6-9AFD-4BBA-80CB-01DA1300E087}" presName="parentText" presStyleLbl="node1" presStyleIdx="0" presStyleCnt="3">
         <dgm:presLayoutVars>
           <dgm:chMax val="1"/>
           <dgm:bulletEnabled val="1"/>
@@ -4938,7 +5169,24 @@
       <dgm:spPr/>
     </dgm:pt>
     <dgm:pt modelId="{B6CE390F-56AC-45A8-A0DF-3A7B8C2FEB1E}" type="pres">
-      <dgm:prSet presAssocID="{2240D41D-9269-4094-AEBC-1664425632DB}" presName="parentText" presStyleLbl="node1" presStyleIdx="1" presStyleCnt="2">
+      <dgm:prSet presAssocID="{2240D41D-9269-4094-AEBC-1664425632DB}" presName="parentText" presStyleLbl="node1" presStyleIdx="1" presStyleCnt="3">
+        <dgm:presLayoutVars>
+          <dgm:chMax val="1"/>
+          <dgm:bulletEnabled val="1"/>
+        </dgm:presLayoutVars>
+      </dgm:prSet>
+      <dgm:spPr/>
+    </dgm:pt>
+    <dgm:pt modelId="{FF48DE76-B89B-4A74-A00B-7781F893FA11}" type="pres">
+      <dgm:prSet presAssocID="{474E530C-8388-441E-8514-9E5C43069E6C}" presName="sp" presStyleCnt="0"/>
+      <dgm:spPr/>
+    </dgm:pt>
+    <dgm:pt modelId="{3E340D75-502F-4147-A22B-12FB71A3EA65}" type="pres">
+      <dgm:prSet presAssocID="{2B7ED56E-EBC9-461A-8FD4-163FA2169B7C}" presName="linNode" presStyleCnt="0"/>
+      <dgm:spPr/>
+    </dgm:pt>
+    <dgm:pt modelId="{9C41D13D-9CC8-48E3-B766-D9CB4071F417}" type="pres">
+      <dgm:prSet presAssocID="{2B7ED56E-EBC9-461A-8FD4-163FA2169B7C}" presName="parentText" presStyleLbl="node1" presStyleIdx="2" presStyleCnt="3">
         <dgm:presLayoutVars>
           <dgm:chMax val="1"/>
           <dgm:bulletEnabled val="1"/>
@@ -4948,6 +5196,8 @@
     </dgm:pt>
   </dgm:ptLst>
   <dgm:cxnLst>
+    <dgm:cxn modelId="{20091702-3A6F-42AF-AB1A-21EEAB08BD84}" type="presOf" srcId="{2B7ED56E-EBC9-461A-8FD4-163FA2169B7C}" destId="{9C41D13D-9CC8-48E3-B766-D9CB4071F417}" srcOrd="0" destOrd="0" presId="urn:microsoft.com/office/officeart/2005/8/layout/vList5"/>
+    <dgm:cxn modelId="{BF555944-BDA0-488C-8626-E7431C0B2A69}" srcId="{1C600E66-A0CB-470F-8514-C91590285CB3}" destId="{2B7ED56E-EBC9-461A-8FD4-163FA2169B7C}" srcOrd="2" destOrd="0" parTransId="{C71D7821-CC2C-4ED6-BFBE-FAE3CC2E8DA1}" sibTransId="{CD9A4AA0-7D39-41C7-9C1A-118ECBD08BD8}"/>
     <dgm:cxn modelId="{5164DF79-C7E6-4470-A977-53A07031A3C0}" type="presOf" srcId="{1C600E66-A0CB-470F-8514-C91590285CB3}" destId="{76D6B6BC-F8F0-4466-930A-673E438AD175}" srcOrd="0" destOrd="0" presId="urn:microsoft.com/office/officeart/2005/8/layout/vList5"/>
     <dgm:cxn modelId="{99A6CC83-AE40-4A47-9C08-1C60E1C3B682}" srcId="{1C600E66-A0CB-470F-8514-C91590285CB3}" destId="{2240D41D-9269-4094-AEBC-1664425632DB}" srcOrd="1" destOrd="0" parTransId="{23766FE5-DD90-4BD8-82A9-33CBDF55210E}" sibTransId="{474E530C-8388-441E-8514-9E5C43069E6C}"/>
     <dgm:cxn modelId="{30C6AD8A-2368-4D50-9E5F-AACEB3623078}" type="presOf" srcId="{2240D41D-9269-4094-AEBC-1664425632DB}" destId="{B6CE390F-56AC-45A8-A0DF-3A7B8C2FEB1E}" srcOrd="0" destOrd="0" presId="urn:microsoft.com/office/officeart/2005/8/layout/vList5"/>
@@ -4958,6 +5208,9 @@
     <dgm:cxn modelId="{A1CEFADC-E666-418E-A8EF-60AF891E80F1}" type="presParOf" srcId="{76D6B6BC-F8F0-4466-930A-673E438AD175}" destId="{4ECE9EB2-DDA7-42FC-BF9E-18B0138FE3B5}" srcOrd="1" destOrd="0" presId="urn:microsoft.com/office/officeart/2005/8/layout/vList5"/>
     <dgm:cxn modelId="{EA31EEF1-153D-49E7-9DDC-711023DD751D}" type="presParOf" srcId="{76D6B6BC-F8F0-4466-930A-673E438AD175}" destId="{365DAA1E-0EA2-4779-BA2C-86211B24E914}" srcOrd="2" destOrd="0" presId="urn:microsoft.com/office/officeart/2005/8/layout/vList5"/>
     <dgm:cxn modelId="{6BFF6DAC-E656-484E-8838-F79ECABD3DD1}" type="presParOf" srcId="{365DAA1E-0EA2-4779-BA2C-86211B24E914}" destId="{B6CE390F-56AC-45A8-A0DF-3A7B8C2FEB1E}" srcOrd="0" destOrd="0" presId="urn:microsoft.com/office/officeart/2005/8/layout/vList5"/>
+    <dgm:cxn modelId="{D765BC93-E9CA-4FCD-9D9E-58F39FC16382}" type="presParOf" srcId="{76D6B6BC-F8F0-4466-930A-673E438AD175}" destId="{FF48DE76-B89B-4A74-A00B-7781F893FA11}" srcOrd="3" destOrd="0" presId="urn:microsoft.com/office/officeart/2005/8/layout/vList5"/>
+    <dgm:cxn modelId="{A14AD7B0-BB9C-48B0-8938-D227B4AFC8CB}" type="presParOf" srcId="{76D6B6BC-F8F0-4466-930A-673E438AD175}" destId="{3E340D75-502F-4147-A22B-12FB71A3EA65}" srcOrd="4" destOrd="0" presId="urn:microsoft.com/office/officeart/2005/8/layout/vList5"/>
+    <dgm:cxn modelId="{F4703A48-C8E3-48BF-8498-747A5B122CF1}" type="presParOf" srcId="{3E340D75-502F-4147-A22B-12FB71A3EA65}" destId="{9C41D13D-9CC8-48E3-B766-D9CB4071F417}" srcOrd="0" destOrd="0" presId="urn:microsoft.com/office/officeart/2005/8/layout/vList5"/>
   </dgm:cxnLst>
   <dgm:bg/>
   <dgm:whole/>
@@ -4984,8 +5237,8 @@
       </dsp:nvSpPr>
       <dsp:spPr>
         <a:xfrm>
-          <a:off x="2044999" y="33"/>
-          <a:ext cx="2300624" cy="1321217"/>
+          <a:off x="2044999" y="1711"/>
+          <a:ext cx="2300624" cy="1129605"/>
         </a:xfrm>
         <a:prstGeom prst="roundRect">
           <a:avLst/>
@@ -5027,12 +5280,12 @@
         </a:fontRef>
       </dsp:style>
       <dsp:txBody>
-        <a:bodyPr spcFirstLastPara="0" vert="horz" wrap="square" lIns="140970" tIns="70485" rIns="140970" bIns="70485" numCol="1" spcCol="1270" anchor="ctr" anchorCtr="0">
+        <a:bodyPr spcFirstLastPara="0" vert="horz" wrap="square" lIns="121920" tIns="60960" rIns="121920" bIns="60960" numCol="1" spcCol="1270" anchor="ctr" anchorCtr="0">
           <a:noAutofit/>
         </a:bodyPr>
         <a:lstStyle/>
         <a:p>
-          <a:pPr marL="0" lvl="0" indent="0" algn="ctr" defTabSz="1644650">
+          <a:pPr marL="0" lvl="0" indent="0" algn="ctr" defTabSz="1422400">
             <a:lnSpc>
               <a:spcPct val="90000"/>
             </a:lnSpc>
@@ -5045,14 +5298,14 @@
             <a:buNone/>
           </a:pPr>
           <a:r>
-            <a:rPr lang="en-US" sz="3700" kern="1200" dirty="0"/>
-            <a:t>GitHub DevOps</a:t>
+            <a:rPr lang="en-US" sz="3200" kern="1200" dirty="0"/>
+            <a:t>Cloud Computing</a:t>
           </a:r>
         </a:p>
       </dsp:txBody>
       <dsp:txXfrm>
-        <a:off x="2109495" y="64529"/>
-        <a:ext cx="2171632" cy="1192225"/>
+        <a:off x="2100142" y="56854"/>
+        <a:ext cx="2190338" cy="1019319"/>
       </dsp:txXfrm>
     </dsp:sp>
     <dsp:sp modelId="{B6CE390F-56AC-45A8-A0DF-3A7B8C2FEB1E}">
@@ -5062,8 +5315,8 @@
       </dsp:nvSpPr>
       <dsp:spPr>
         <a:xfrm>
-          <a:off x="2044999" y="1387311"/>
-          <a:ext cx="2300624" cy="1321217"/>
+          <a:off x="2044999" y="1187797"/>
+          <a:ext cx="2300624" cy="1129605"/>
         </a:xfrm>
         <a:prstGeom prst="roundRect">
           <a:avLst/>
@@ -5105,12 +5358,12 @@
         </a:fontRef>
       </dsp:style>
       <dsp:txBody>
-        <a:bodyPr spcFirstLastPara="0" vert="horz" wrap="square" lIns="140970" tIns="70485" rIns="140970" bIns="70485" numCol="1" spcCol="1270" anchor="ctr" anchorCtr="0">
+        <a:bodyPr spcFirstLastPara="0" vert="horz" wrap="square" lIns="121920" tIns="60960" rIns="121920" bIns="60960" numCol="1" spcCol="1270" anchor="ctr" anchorCtr="0">
           <a:noAutofit/>
         </a:bodyPr>
         <a:lstStyle/>
         <a:p>
-          <a:pPr marL="0" lvl="0" indent="0" algn="ctr" defTabSz="1644650">
+          <a:pPr marL="0" lvl="0" indent="0" algn="ctr" defTabSz="1422400">
             <a:lnSpc>
               <a:spcPct val="90000"/>
             </a:lnSpc>
@@ -5123,14 +5376,92 @@
             <a:buNone/>
           </a:pPr>
           <a:r>
-            <a:rPr lang="en-US" sz="3700" kern="1200" dirty="0"/>
-            <a:t>Azure DevOps</a:t>
+            <a:rPr lang="en-US" sz="3200" kern="1200" dirty="0"/>
+            <a:t>AWS</a:t>
           </a:r>
         </a:p>
       </dsp:txBody>
       <dsp:txXfrm>
-        <a:off x="2109495" y="1451807"/>
-        <a:ext cx="2171632" cy="1192225"/>
+        <a:off x="2100142" y="1242940"/>
+        <a:ext cx="2190338" cy="1019319"/>
+      </dsp:txXfrm>
+    </dsp:sp>
+    <dsp:sp modelId="{9C41D13D-9CC8-48E3-B766-D9CB4071F417}">
+      <dsp:nvSpPr>
+        <dsp:cNvPr id="0" name=""/>
+        <dsp:cNvSpPr/>
+      </dsp:nvSpPr>
+      <dsp:spPr>
+        <a:xfrm>
+          <a:off x="2044999" y="2373883"/>
+          <a:ext cx="2300624" cy="1129605"/>
+        </a:xfrm>
+        <a:prstGeom prst="roundRect">
+          <a:avLst/>
+        </a:prstGeom>
+        <a:solidFill>
+          <a:schemeClr val="accent1">
+            <a:hueOff val="0"/>
+            <a:satOff val="0"/>
+            <a:lumOff val="0"/>
+            <a:alphaOff val="0"/>
+          </a:schemeClr>
+        </a:solidFill>
+        <a:ln w="12700" cap="flat" cmpd="sng" algn="ctr">
+          <a:solidFill>
+            <a:schemeClr val="lt1">
+              <a:hueOff val="0"/>
+              <a:satOff val="0"/>
+              <a:lumOff val="0"/>
+              <a:alphaOff val="0"/>
+            </a:schemeClr>
+          </a:solidFill>
+          <a:prstDash val="solid"/>
+          <a:miter lim="800000"/>
+        </a:ln>
+        <a:effectLst/>
+      </dsp:spPr>
+      <dsp:style>
+        <a:lnRef idx="2">
+          <a:scrgbClr r="0" g="0" b="0"/>
+        </a:lnRef>
+        <a:fillRef idx="1">
+          <a:scrgbClr r="0" g="0" b="0"/>
+        </a:fillRef>
+        <a:effectRef idx="0">
+          <a:scrgbClr r="0" g="0" b="0"/>
+        </a:effectRef>
+        <a:fontRef idx="minor">
+          <a:schemeClr val="lt1"/>
+        </a:fontRef>
+      </dsp:style>
+      <dsp:txBody>
+        <a:bodyPr spcFirstLastPara="0" vert="horz" wrap="square" lIns="121920" tIns="60960" rIns="121920" bIns="60960" numCol="1" spcCol="1270" anchor="ctr" anchorCtr="0">
+          <a:noAutofit/>
+        </a:bodyPr>
+        <a:lstStyle/>
+        <a:p>
+          <a:pPr marL="0" lvl="0" indent="0" algn="ctr" defTabSz="1422400">
+            <a:lnSpc>
+              <a:spcPct val="90000"/>
+            </a:lnSpc>
+            <a:spcBef>
+              <a:spcPct val="0"/>
+            </a:spcBef>
+            <a:spcAft>
+              <a:spcPct val="35000"/>
+            </a:spcAft>
+            <a:buNone/>
+          </a:pPr>
+          <a:r>
+            <a:rPr lang="en-US" sz="3200" kern="1200" dirty="0"/>
+            <a:t>Azure</a:t>
+          </a:r>
+        </a:p>
+      </dsp:txBody>
+      <dsp:txXfrm>
+        <a:off x="2100142" y="2429026"/>
+        <a:ext cx="2190338" cy="1019319"/>
       </dsp:txXfrm>
     </dsp:sp>
   </dsp:spTree>
@@ -6486,7 +6817,7 @@
           <a:p>
             <a:fld id="{14FB1113-EC1E-4052-ADC3-711A8186C8F9}" type="datetimeFigureOut">
               <a:rPr lang="ru-UA" smtClean="0"/>
-              <a:t>30.01.2024</a:t>
+              <a:t>31.01.2024</a:t>
             </a:fld>
             <a:endParaRPr lang="ru-UA"/>
           </a:p>
@@ -6903,7 +7234,7 @@
           <a:p>
             <a:fld id="{0B8962EF-F649-4BF0-B0CB-D71423952154}" type="datetime1">
               <a:rPr lang="ru-UA" smtClean="0"/>
-              <a:t>30.01.2024</a:t>
+              <a:t>31.01.2024</a:t>
             </a:fld>
             <a:endParaRPr lang="ru-UA"/>
           </a:p>
@@ -7107,7 +7438,7 @@
           <a:p>
             <a:fld id="{52B04991-4203-48C2-B120-290746D8BC41}" type="datetime1">
               <a:rPr lang="ru-UA" smtClean="0"/>
-              <a:t>30.01.2024</a:t>
+              <a:t>31.01.2024</a:t>
             </a:fld>
             <a:endParaRPr lang="ru-UA"/>
           </a:p>
@@ -7321,7 +7652,7 @@
           <a:p>
             <a:fld id="{207AB121-CB86-4DCF-9E3D-2A0553392796}" type="datetime1">
               <a:rPr lang="ru-UA" smtClean="0"/>
-              <a:t>30.01.2024</a:t>
+              <a:t>31.01.2024</a:t>
             </a:fld>
             <a:endParaRPr lang="ru-UA"/>
           </a:p>
@@ -7525,7 +7856,7 @@
           <a:p>
             <a:fld id="{8467C913-2051-48A1-86F2-D1DABB2E6F13}" type="datetime1">
               <a:rPr lang="ru-UA" smtClean="0"/>
-              <a:t>30.01.2024</a:t>
+              <a:t>31.01.2024</a:t>
             </a:fld>
             <a:endParaRPr lang="ru-UA"/>
           </a:p>
@@ -7751,7 +8082,7 @@
           <a:p>
             <a:fld id="{C75B975F-BA21-4E1C-99B6-ABED30F89540}" type="datetime1">
               <a:rPr lang="ru-UA" smtClean="0"/>
-              <a:t>30.01.2024</a:t>
+              <a:t>31.01.2024</a:t>
             </a:fld>
             <a:endParaRPr lang="ru-UA"/>
           </a:p>
@@ -7955,7 +8286,7 @@
           <a:p>
             <a:fld id="{649A85F2-FE43-4F23-9D2D-558360D289A8}" type="datetime1">
               <a:rPr lang="ru-UA" smtClean="0"/>
-              <a:t>30.01.2024</a:t>
+              <a:t>31.01.2024</a:t>
             </a:fld>
             <a:endParaRPr lang="ru-UA"/>
           </a:p>
@@ -8235,7 +8566,7 @@
           <a:p>
             <a:fld id="{3C823F1E-25D4-4C19-9C16-57D27B598CE0}" type="datetime1">
               <a:rPr lang="ru-UA" smtClean="0"/>
-              <a:t>30.01.2024</a:t>
+              <a:t>31.01.2024</a:t>
             </a:fld>
             <a:endParaRPr lang="ru-UA"/>
           </a:p>
@@ -8507,7 +8838,7 @@
           <a:p>
             <a:fld id="{0FCE2DAB-FCC6-443D-91B5-F43A7B78C6B9}" type="datetime1">
               <a:rPr lang="ru-UA" smtClean="0"/>
-              <a:t>30.01.2024</a:t>
+              <a:t>31.01.2024</a:t>
             </a:fld>
             <a:endParaRPr lang="ru-UA"/>
           </a:p>
@@ -8926,7 +9257,7 @@
           <a:p>
             <a:fld id="{B647925C-949E-4C3F-B87F-94A502A4557F}" type="datetime1">
               <a:rPr lang="ru-UA" smtClean="0"/>
-              <a:t>30.01.2024</a:t>
+              <a:t>31.01.2024</a:t>
             </a:fld>
             <a:endParaRPr lang="ru-UA"/>
           </a:p>
@@ -9072,7 +9403,7 @@
           <a:p>
             <a:fld id="{9CE8CD01-0F29-4954-897C-1CC212183DBB}" type="datetime1">
               <a:rPr lang="ru-UA" smtClean="0"/>
-              <a:t>30.01.2024</a:t>
+              <a:t>31.01.2024</a:t>
             </a:fld>
             <a:endParaRPr lang="ru-UA"/>
           </a:p>
@@ -9189,7 +9520,7 @@
           <a:p>
             <a:fld id="{150095DC-0E76-47E5-A99D-2467BE30280E}" type="datetime1">
               <a:rPr lang="ru-UA" smtClean="0"/>
-              <a:t>30.01.2024</a:t>
+              <a:t>31.01.2024</a:t>
             </a:fld>
             <a:endParaRPr lang="ru-UA"/>
           </a:p>
@@ -9506,7 +9837,7 @@
           <a:p>
             <a:fld id="{CC7126BF-809C-4659-95F5-CCF148063973}" type="datetime1">
               <a:rPr lang="ru-UA" smtClean="0"/>
-              <a:t>30.01.2024</a:t>
+              <a:t>31.01.2024</a:t>
             </a:fld>
             <a:endParaRPr lang="ru-UA"/>
           </a:p>
@@ -9799,7 +10130,7 @@
           <a:p>
             <a:fld id="{D2EFC65D-56A3-455E-BFA5-3848A656380B}" type="datetime1">
               <a:rPr lang="ru-UA" smtClean="0"/>
-              <a:t>30.01.2024</a:t>
+              <a:t>31.01.2024</a:t>
             </a:fld>
             <a:endParaRPr lang="ru-UA"/>
           </a:p>
@@ -10046,7 +10377,7 @@
           <a:p>
             <a:fld id="{5E1B79E6-2B08-45F0-89F7-F914E581FDE2}" type="datetime1">
               <a:rPr lang="ru-UA" smtClean="0"/>
-              <a:t>30.01.2024</a:t>
+              <a:t>31.01.2024</a:t>
             </a:fld>
             <a:endParaRPr lang="ru-UA"/>
           </a:p>
@@ -10621,7 +10952,7 @@
           <a:p>
             <a:fld id="{50344D1B-5235-486F-A999-CD74520911B6}" type="datetime1">
               <a:rPr lang="ru-UA" smtClean="0"/>
-              <a:t>30.01.2024</a:t>
+              <a:t>31.01.2024</a:t>
             </a:fld>
             <a:endParaRPr lang="ru-UA"/>
           </a:p>
@@ -13916,14 +14247,14 @@
             <p:ph idx="1"/>
             <p:extLst>
               <p:ext uri="{D42A27DB-BD31-4B8C-83A1-F6EECF244321}">
-                <p14:modId xmlns:p14="http://schemas.microsoft.com/office/powerpoint/2010/main" val="3825485357"/>
+                <p14:modId xmlns:p14="http://schemas.microsoft.com/office/powerpoint/2010/main" val="1793774275"/>
               </p:ext>
             </p:extLst>
           </p:nvPr>
         </p:nvGraphicFramePr>
         <p:xfrm>
           <a:off x="4654732" y="1482436"/>
-          <a:ext cx="6390623" cy="2708563"/>
+          <a:ext cx="6390623" cy="3505200"/>
         </p:xfrm>
         <a:graphic>
           <a:graphicData uri="http://schemas.openxmlformats.org/drawingml/2006/diagram">
@@ -18196,7 +18527,7 @@
 </p:sld>
 </file>
 
-<file path=ppt/slides/slide4.xml><?xml version="1.0" encoding="utf-8"?>
+<file path=ppt/slides/slide38.xml><?xml version="1.0" encoding="utf-8"?>
 <p:sld xmlns:a="http://schemas.openxmlformats.org/drawingml/2006/main" xmlns:r="http://schemas.openxmlformats.org/officeDocument/2006/relationships" xmlns:p="http://schemas.openxmlformats.org/presentationml/2006/main">
   <p:cSld>
     <p:bg>
@@ -18306,6 +18637,426 @@
         <p:spPr>
           <a:xfrm>
             <a:off x="889000" y="1967266"/>
+            <a:ext cx="2865582" cy="2547257"/>
+          </a:xfrm>
+          <a:noFill/>
+        </p:spPr>
+        <p:txBody>
+          <a:bodyPr vert="horz" lIns="91440" tIns="45720" rIns="91440" bIns="45720" rtlCol="0" anchor="ctr">
+            <a:normAutofit/>
+          </a:bodyPr>
+          <a:lstStyle/>
+          <a:p>
+            <a:pPr algn="ctr"/>
+            <a:r>
+              <a:rPr lang="en-US" sz="3600" kern="1200" dirty="0">
+                <a:solidFill>
+                  <a:srgbClr val="FFFFFF"/>
+                </a:solidFill>
+                <a:latin typeface="+mj-lt"/>
+                <a:ea typeface="+mj-ea"/>
+                <a:cs typeface="+mj-cs"/>
+              </a:rPr>
+              <a:t>Azure SQL Database</a:t>
+            </a:r>
+          </a:p>
+        </p:txBody>
+      </p:sp>
+      <p:sp>
+        <p:nvSpPr>
+          <p:cNvPr id="3" name="Footer Placeholder 2">
+            <a:extLst>
+              <a:ext uri="{FF2B5EF4-FFF2-40B4-BE49-F238E27FC236}">
+                <a16:creationId xmlns:a16="http://schemas.microsoft.com/office/drawing/2014/main" id="{5AA19FA0-A765-8169-03F1-928E3EF7B595}"/>
+              </a:ext>
+            </a:extLst>
+          </p:cNvPr>
+          <p:cNvSpPr>
+            <a:spLocks noGrp="1"/>
+          </p:cNvSpPr>
+          <p:nvPr>
+            <p:ph type="ftr" sz="quarter" idx="11"/>
+          </p:nvPr>
+        </p:nvSpPr>
+        <p:spPr/>
+        <p:txBody>
+          <a:bodyPr/>
+          <a:lstStyle/>
+          <a:p>
+            <a:r>
+              <a:rPr lang="es-ES"/>
+              <a:t>Step 1 - Model - ver. 1</a:t>
+            </a:r>
+            <a:endParaRPr lang="ru-UA"/>
+          </a:p>
+        </p:txBody>
+      </p:sp>
+      <p:pic>
+        <p:nvPicPr>
+          <p:cNvPr id="6" name="Picture 5" descr="A screenshot of a computer&#10;&#10;Description automatically generated">
+            <a:extLst>
+              <a:ext uri="{FF2B5EF4-FFF2-40B4-BE49-F238E27FC236}">
+                <a16:creationId xmlns:a16="http://schemas.microsoft.com/office/drawing/2014/main" id="{50977CD2-8BCA-7C85-386A-DB7981EA0615}"/>
+              </a:ext>
+            </a:extLst>
+          </p:cNvPr>
+          <p:cNvPicPr>
+            <a:picLocks noChangeAspect="1"/>
+          </p:cNvPicPr>
+          <p:nvPr/>
+        </p:nvPicPr>
+        <p:blipFill>
+          <a:blip r:embed="rId2">
+            <a:extLst>
+              <a:ext uri="{28A0092B-C50C-407E-A947-70E740481C1C}">
+                <a14:useLocalDpi xmlns:a14="http://schemas.microsoft.com/office/drawing/2010/main" val="0"/>
+              </a:ext>
+            </a:extLst>
+          </a:blip>
+          <a:stretch>
+            <a:fillRect/>
+          </a:stretch>
+        </p:blipFill>
+        <p:spPr>
+          <a:xfrm>
+            <a:off x="4828309" y="754639"/>
+            <a:ext cx="5966835" cy="5966835"/>
+          </a:xfrm>
+          <a:prstGeom prst="rect">
+            <a:avLst/>
+          </a:prstGeom>
+        </p:spPr>
+      </p:pic>
+    </p:spTree>
+    <p:extLst>
+      <p:ext uri="{BB962C8B-B14F-4D97-AF65-F5344CB8AC3E}">
+        <p14:creationId xmlns:p14="http://schemas.microsoft.com/office/powerpoint/2010/main" val="1296882423"/>
+      </p:ext>
+    </p:extLst>
+  </p:cSld>
+  <p:clrMapOvr>
+    <a:masterClrMapping/>
+  </p:clrMapOvr>
+</p:sld>
+</file>
+
+<file path=ppt/slides/slide39.xml><?xml version="1.0" encoding="utf-8"?>
+<p:sld xmlns:a="http://schemas.openxmlformats.org/drawingml/2006/main" xmlns:r="http://schemas.openxmlformats.org/officeDocument/2006/relationships" xmlns:p="http://schemas.openxmlformats.org/presentationml/2006/main">
+  <p:cSld>
+    <p:bg>
+      <p:bgPr>
+        <a:solidFill>
+          <a:schemeClr val="bg1"/>
+        </a:solidFill>
+        <a:effectLst/>
+      </p:bgPr>
+    </p:bg>
+    <p:spTree>
+      <p:nvGrpSpPr>
+        <p:cNvPr id="1" name=""/>
+        <p:cNvGrpSpPr/>
+        <p:nvPr/>
+      </p:nvGrpSpPr>
+      <p:grpSpPr>
+        <a:xfrm>
+          <a:off x="0" y="0"/>
+          <a:ext cx="0" cy="0"/>
+          <a:chOff x="0" y="0"/>
+          <a:chExt cx="0" cy="0"/>
+        </a:xfrm>
+      </p:grpSpPr>
+      <p:sp>
+        <p:nvSpPr>
+          <p:cNvPr id="24" name="Down Arrow 7">
+            <a:extLst>
+              <a:ext uri="{FF2B5EF4-FFF2-40B4-BE49-F238E27FC236}">
+                <a16:creationId xmlns:a16="http://schemas.microsoft.com/office/drawing/2014/main" id="{D4771268-CB57-404A-9271-370EB28F6090}"/>
+              </a:ext>
+              <a:ext uri="{C183D7F6-B498-43B3-948B-1728B52AA6E4}">
+                <adec:decorative xmlns:adec="http://schemas.microsoft.com/office/drawing/2017/decorative" val="1"/>
+              </a:ext>
+            </a:extLst>
+          </p:cNvPr>
+          <p:cNvSpPr>
+            <a:spLocks noGrp="1" noRot="1" noChangeAspect="1" noMove="1" noResize="1" noEditPoints="1" noAdjustHandles="1" noChangeArrowheads="1" noChangeShapeType="1" noTextEdit="1"/>
+          </p:cNvSpPr>
+          <p:nvPr>
+            <p:extLst>
+              <p:ext uri="{386F3935-93C4-4BCD-93E2-E3B085C9AB24}">
+                <p16:designElem xmlns:p16="http://schemas.microsoft.com/office/powerpoint/2015/main" val="1"/>
+              </p:ext>
+            </p:extLst>
+          </p:nvPr>
+        </p:nvSpPr>
+        <p:spPr>
+          <a:xfrm rot="16200000">
+            <a:off x="800100" y="1491343"/>
+            <a:ext cx="3333749" cy="3499103"/>
+          </a:xfrm>
+          <a:prstGeom prst="downArrow">
+            <a:avLst>
+              <a:gd name="adj1" fmla="val 100000"/>
+              <a:gd name="adj2" fmla="val 15788"/>
+            </a:avLst>
+          </a:prstGeom>
+          <a:solidFill>
+            <a:srgbClr val="404040"/>
+          </a:solidFill>
+          <a:ln w="53975">
+            <a:noFill/>
+          </a:ln>
+        </p:spPr>
+        <p:style>
+          <a:lnRef idx="2">
+            <a:schemeClr val="accent1">
+              <a:shade val="50000"/>
+            </a:schemeClr>
+          </a:lnRef>
+          <a:fillRef idx="1">
+            <a:schemeClr val="accent1"/>
+          </a:fillRef>
+          <a:effectRef idx="0">
+            <a:schemeClr val="accent1"/>
+          </a:effectRef>
+          <a:fontRef idx="minor">
+            <a:schemeClr val="lt1"/>
+          </a:fontRef>
+        </p:style>
+        <p:txBody>
+          <a:bodyPr rtlCol="0" anchor="ctr"/>
+          <a:lstStyle/>
+          <a:p>
+            <a:pPr algn="ctr"/>
+            <a:endParaRPr lang="en-US"/>
+          </a:p>
+        </p:txBody>
+      </p:sp>
+      <p:sp>
+        <p:nvSpPr>
+          <p:cNvPr id="2" name="Title 1">
+            <a:extLst>
+              <a:ext uri="{FF2B5EF4-FFF2-40B4-BE49-F238E27FC236}">
+                <a16:creationId xmlns:a16="http://schemas.microsoft.com/office/drawing/2014/main" id="{53C5D828-9666-E312-B574-9FE965A7D6BE}"/>
+              </a:ext>
+            </a:extLst>
+          </p:cNvPr>
+          <p:cNvSpPr>
+            <a:spLocks noGrp="1"/>
+          </p:cNvSpPr>
+          <p:nvPr>
+            <p:ph type="title"/>
+          </p:nvPr>
+        </p:nvSpPr>
+        <p:spPr>
+          <a:xfrm>
+            <a:off x="889000" y="1967266"/>
+            <a:ext cx="2865582" cy="2547257"/>
+          </a:xfrm>
+          <a:noFill/>
+        </p:spPr>
+        <p:txBody>
+          <a:bodyPr vert="horz" lIns="91440" tIns="45720" rIns="91440" bIns="45720" rtlCol="0" anchor="ctr">
+            <a:normAutofit/>
+          </a:bodyPr>
+          <a:lstStyle/>
+          <a:p>
+            <a:pPr algn="ctr"/>
+            <a:r>
+              <a:rPr lang="en-US" sz="3600" kern="1200" dirty="0">
+                <a:solidFill>
+                  <a:srgbClr val="FFFFFF"/>
+                </a:solidFill>
+                <a:latin typeface="+mj-lt"/>
+                <a:ea typeface="+mj-ea"/>
+                <a:cs typeface="+mj-cs"/>
+              </a:rPr>
+              <a:t>Azure Cosmos DB</a:t>
+            </a:r>
+          </a:p>
+        </p:txBody>
+      </p:sp>
+      <p:sp>
+        <p:nvSpPr>
+          <p:cNvPr id="3" name="Footer Placeholder 2">
+            <a:extLst>
+              <a:ext uri="{FF2B5EF4-FFF2-40B4-BE49-F238E27FC236}">
+                <a16:creationId xmlns:a16="http://schemas.microsoft.com/office/drawing/2014/main" id="{5AA19FA0-A765-8169-03F1-928E3EF7B595}"/>
+              </a:ext>
+            </a:extLst>
+          </p:cNvPr>
+          <p:cNvSpPr>
+            <a:spLocks noGrp="1"/>
+          </p:cNvSpPr>
+          <p:nvPr>
+            <p:ph type="ftr" sz="quarter" idx="11"/>
+          </p:nvPr>
+        </p:nvSpPr>
+        <p:spPr/>
+        <p:txBody>
+          <a:bodyPr/>
+          <a:lstStyle/>
+          <a:p>
+            <a:r>
+              <a:rPr lang="es-ES"/>
+              <a:t>Step 1 - Model - ver. 1</a:t>
+            </a:r>
+            <a:endParaRPr lang="ru-UA"/>
+          </a:p>
+        </p:txBody>
+      </p:sp>
+      <p:pic>
+        <p:nvPicPr>
+          <p:cNvPr id="5" name="Picture 4">
+            <a:extLst>
+              <a:ext uri="{FF2B5EF4-FFF2-40B4-BE49-F238E27FC236}">
+                <a16:creationId xmlns:a16="http://schemas.microsoft.com/office/drawing/2014/main" id="{3909FDCD-7A4B-E5C6-1FC1-DA89E6608C59}"/>
+              </a:ext>
+            </a:extLst>
+          </p:cNvPr>
+          <p:cNvPicPr>
+            <a:picLocks noChangeAspect="1"/>
+          </p:cNvPicPr>
+          <p:nvPr/>
+        </p:nvPicPr>
+        <p:blipFill>
+          <a:blip r:embed="rId2"/>
+          <a:stretch>
+            <a:fillRect/>
+          </a:stretch>
+        </p:blipFill>
+        <p:spPr>
+          <a:xfrm>
+            <a:off x="5875213" y="1471612"/>
+            <a:ext cx="4200525" cy="3914775"/>
+          </a:xfrm>
+          <a:prstGeom prst="rect">
+            <a:avLst/>
+          </a:prstGeom>
+        </p:spPr>
+      </p:pic>
+    </p:spTree>
+    <p:extLst>
+      <p:ext uri="{BB962C8B-B14F-4D97-AF65-F5344CB8AC3E}">
+        <p14:creationId xmlns:p14="http://schemas.microsoft.com/office/powerpoint/2010/main" val="2578212810"/>
+      </p:ext>
+    </p:extLst>
+  </p:cSld>
+  <p:clrMapOvr>
+    <a:masterClrMapping/>
+  </p:clrMapOvr>
+</p:sld>
+</file>
+
+<file path=ppt/slides/slide4.xml><?xml version="1.0" encoding="utf-8"?>
+<p:sld xmlns:a="http://schemas.openxmlformats.org/drawingml/2006/main" xmlns:r="http://schemas.openxmlformats.org/officeDocument/2006/relationships" xmlns:p="http://schemas.openxmlformats.org/presentationml/2006/main">
+  <p:cSld>
+    <p:bg>
+      <p:bgPr>
+        <a:solidFill>
+          <a:schemeClr val="bg1"/>
+        </a:solidFill>
+        <a:effectLst/>
+      </p:bgPr>
+    </p:bg>
+    <p:spTree>
+      <p:nvGrpSpPr>
+        <p:cNvPr id="1" name=""/>
+        <p:cNvGrpSpPr/>
+        <p:nvPr/>
+      </p:nvGrpSpPr>
+      <p:grpSpPr>
+        <a:xfrm>
+          <a:off x="0" y="0"/>
+          <a:ext cx="0" cy="0"/>
+          <a:chOff x="0" y="0"/>
+          <a:chExt cx="0" cy="0"/>
+        </a:xfrm>
+      </p:grpSpPr>
+      <p:sp>
+        <p:nvSpPr>
+          <p:cNvPr id="24" name="Down Arrow 7">
+            <a:extLst>
+              <a:ext uri="{FF2B5EF4-FFF2-40B4-BE49-F238E27FC236}">
+                <a16:creationId xmlns:a16="http://schemas.microsoft.com/office/drawing/2014/main" id="{D4771268-CB57-404A-9271-370EB28F6090}"/>
+              </a:ext>
+              <a:ext uri="{C183D7F6-B498-43B3-948B-1728B52AA6E4}">
+                <adec:decorative xmlns:adec="http://schemas.microsoft.com/office/drawing/2017/decorative" val="1"/>
+              </a:ext>
+            </a:extLst>
+          </p:cNvPr>
+          <p:cNvSpPr>
+            <a:spLocks noGrp="1" noRot="1" noChangeAspect="1" noMove="1" noResize="1" noEditPoints="1" noAdjustHandles="1" noChangeArrowheads="1" noChangeShapeType="1" noTextEdit="1"/>
+          </p:cNvSpPr>
+          <p:nvPr>
+            <p:extLst>
+              <p:ext uri="{386F3935-93C4-4BCD-93E2-E3B085C9AB24}">
+                <p16:designElem xmlns:p16="http://schemas.microsoft.com/office/powerpoint/2015/main" val="1"/>
+              </p:ext>
+            </p:extLst>
+          </p:nvPr>
+        </p:nvSpPr>
+        <p:spPr>
+          <a:xfrm rot="16200000">
+            <a:off x="800100" y="1491343"/>
+            <a:ext cx="3333749" cy="3499103"/>
+          </a:xfrm>
+          <a:prstGeom prst="downArrow">
+            <a:avLst>
+              <a:gd name="adj1" fmla="val 100000"/>
+              <a:gd name="adj2" fmla="val 15788"/>
+            </a:avLst>
+          </a:prstGeom>
+          <a:solidFill>
+            <a:srgbClr val="404040"/>
+          </a:solidFill>
+          <a:ln w="53975">
+            <a:noFill/>
+          </a:ln>
+        </p:spPr>
+        <p:style>
+          <a:lnRef idx="2">
+            <a:schemeClr val="accent1">
+              <a:shade val="50000"/>
+            </a:schemeClr>
+          </a:lnRef>
+          <a:fillRef idx="1">
+            <a:schemeClr val="accent1"/>
+          </a:fillRef>
+          <a:effectRef idx="0">
+            <a:schemeClr val="accent1"/>
+          </a:effectRef>
+          <a:fontRef idx="minor">
+            <a:schemeClr val="lt1"/>
+          </a:fontRef>
+        </p:style>
+        <p:txBody>
+          <a:bodyPr rtlCol="0" anchor="ctr"/>
+          <a:lstStyle/>
+          <a:p>
+            <a:pPr algn="ctr"/>
+            <a:endParaRPr lang="en-US"/>
+          </a:p>
+        </p:txBody>
+      </p:sp>
+      <p:sp>
+        <p:nvSpPr>
+          <p:cNvPr id="2" name="Title 1">
+            <a:extLst>
+              <a:ext uri="{FF2B5EF4-FFF2-40B4-BE49-F238E27FC236}">
+                <a16:creationId xmlns:a16="http://schemas.microsoft.com/office/drawing/2014/main" id="{53C5D828-9666-E312-B574-9FE965A7D6BE}"/>
+              </a:ext>
+            </a:extLst>
+          </p:cNvPr>
+          <p:cNvSpPr>
+            <a:spLocks noGrp="1"/>
+          </p:cNvSpPr>
+          <p:nvPr>
+            <p:ph type="title"/>
+          </p:nvPr>
+        </p:nvSpPr>
+        <p:spPr>
+          <a:xfrm>
+            <a:off x="889000" y="1967266"/>
             <a:ext cx="2768600" cy="2547257"/>
           </a:xfrm>
           <a:noFill/>
@@ -18410,6 +19161,627 @@
     <p:extLst>
       <p:ext uri="{BB962C8B-B14F-4D97-AF65-F5344CB8AC3E}">
         <p14:creationId xmlns:p14="http://schemas.microsoft.com/office/powerpoint/2010/main" val="4197480136"/>
+      </p:ext>
+    </p:extLst>
+  </p:cSld>
+  <p:clrMapOvr>
+    <a:masterClrMapping/>
+  </p:clrMapOvr>
+</p:sld>
+</file>
+
+<file path=ppt/slides/slide40.xml><?xml version="1.0" encoding="utf-8"?>
+<p:sld xmlns:a="http://schemas.openxmlformats.org/drawingml/2006/main" xmlns:r="http://schemas.openxmlformats.org/officeDocument/2006/relationships" xmlns:p="http://schemas.openxmlformats.org/presentationml/2006/main">
+  <p:cSld>
+    <p:bg>
+      <p:bgPr>
+        <a:solidFill>
+          <a:schemeClr val="bg1"/>
+        </a:solidFill>
+        <a:effectLst/>
+      </p:bgPr>
+    </p:bg>
+    <p:spTree>
+      <p:nvGrpSpPr>
+        <p:cNvPr id="1" name=""/>
+        <p:cNvGrpSpPr/>
+        <p:nvPr/>
+      </p:nvGrpSpPr>
+      <p:grpSpPr>
+        <a:xfrm>
+          <a:off x="0" y="0"/>
+          <a:ext cx="0" cy="0"/>
+          <a:chOff x="0" y="0"/>
+          <a:chExt cx="0" cy="0"/>
+        </a:xfrm>
+      </p:grpSpPr>
+      <p:sp>
+        <p:nvSpPr>
+          <p:cNvPr id="24" name="Down Arrow 7">
+            <a:extLst>
+              <a:ext uri="{FF2B5EF4-FFF2-40B4-BE49-F238E27FC236}">
+                <a16:creationId xmlns:a16="http://schemas.microsoft.com/office/drawing/2014/main" id="{D4771268-CB57-404A-9271-370EB28F6090}"/>
+              </a:ext>
+              <a:ext uri="{C183D7F6-B498-43B3-948B-1728B52AA6E4}">
+                <adec:decorative xmlns:adec="http://schemas.microsoft.com/office/drawing/2017/decorative" val="1"/>
+              </a:ext>
+            </a:extLst>
+          </p:cNvPr>
+          <p:cNvSpPr>
+            <a:spLocks noGrp="1" noRot="1" noChangeAspect="1" noMove="1" noResize="1" noEditPoints="1" noAdjustHandles="1" noChangeArrowheads="1" noChangeShapeType="1" noTextEdit="1"/>
+          </p:cNvSpPr>
+          <p:nvPr>
+            <p:extLst>
+              <p:ext uri="{386F3935-93C4-4BCD-93E2-E3B085C9AB24}">
+                <p16:designElem xmlns:p16="http://schemas.microsoft.com/office/powerpoint/2015/main" val="1"/>
+              </p:ext>
+            </p:extLst>
+          </p:nvPr>
+        </p:nvSpPr>
+        <p:spPr>
+          <a:xfrm rot="16200000">
+            <a:off x="800100" y="1491343"/>
+            <a:ext cx="3333749" cy="3499103"/>
+          </a:xfrm>
+          <a:prstGeom prst="downArrow">
+            <a:avLst>
+              <a:gd name="adj1" fmla="val 100000"/>
+              <a:gd name="adj2" fmla="val 15788"/>
+            </a:avLst>
+          </a:prstGeom>
+          <a:solidFill>
+            <a:srgbClr val="404040"/>
+          </a:solidFill>
+          <a:ln w="53975">
+            <a:noFill/>
+          </a:ln>
+        </p:spPr>
+        <p:style>
+          <a:lnRef idx="2">
+            <a:schemeClr val="accent1">
+              <a:shade val="50000"/>
+            </a:schemeClr>
+          </a:lnRef>
+          <a:fillRef idx="1">
+            <a:schemeClr val="accent1"/>
+          </a:fillRef>
+          <a:effectRef idx="0">
+            <a:schemeClr val="accent1"/>
+          </a:effectRef>
+          <a:fontRef idx="minor">
+            <a:schemeClr val="lt1"/>
+          </a:fontRef>
+        </p:style>
+        <p:txBody>
+          <a:bodyPr rtlCol="0" anchor="ctr"/>
+          <a:lstStyle/>
+          <a:p>
+            <a:pPr algn="ctr"/>
+            <a:endParaRPr lang="en-US"/>
+          </a:p>
+        </p:txBody>
+      </p:sp>
+      <p:sp>
+        <p:nvSpPr>
+          <p:cNvPr id="2" name="Title 1">
+            <a:extLst>
+              <a:ext uri="{FF2B5EF4-FFF2-40B4-BE49-F238E27FC236}">
+                <a16:creationId xmlns:a16="http://schemas.microsoft.com/office/drawing/2014/main" id="{53C5D828-9666-E312-B574-9FE965A7D6BE}"/>
+              </a:ext>
+            </a:extLst>
+          </p:cNvPr>
+          <p:cNvSpPr>
+            <a:spLocks noGrp="1"/>
+          </p:cNvSpPr>
+          <p:nvPr>
+            <p:ph type="title"/>
+          </p:nvPr>
+        </p:nvSpPr>
+        <p:spPr>
+          <a:xfrm>
+            <a:off x="889000" y="1967266"/>
+            <a:ext cx="2865582" cy="2547257"/>
+          </a:xfrm>
+          <a:noFill/>
+        </p:spPr>
+        <p:txBody>
+          <a:bodyPr vert="horz" lIns="91440" tIns="45720" rIns="91440" bIns="45720" rtlCol="0" anchor="ctr">
+            <a:normAutofit/>
+          </a:bodyPr>
+          <a:lstStyle/>
+          <a:p>
+            <a:pPr algn="ctr"/>
+            <a:r>
+              <a:rPr lang="en-US" sz="3600" kern="1200" dirty="0">
+                <a:solidFill>
+                  <a:srgbClr val="FFFFFF"/>
+                </a:solidFill>
+                <a:latin typeface="+mj-lt"/>
+                <a:ea typeface="+mj-ea"/>
+                <a:cs typeface="+mj-cs"/>
+              </a:rPr>
+              <a:t>Azure Monitor</a:t>
+            </a:r>
+          </a:p>
+        </p:txBody>
+      </p:sp>
+      <p:sp>
+        <p:nvSpPr>
+          <p:cNvPr id="3" name="Footer Placeholder 2">
+            <a:extLst>
+              <a:ext uri="{FF2B5EF4-FFF2-40B4-BE49-F238E27FC236}">
+                <a16:creationId xmlns:a16="http://schemas.microsoft.com/office/drawing/2014/main" id="{5AA19FA0-A765-8169-03F1-928E3EF7B595}"/>
+              </a:ext>
+            </a:extLst>
+          </p:cNvPr>
+          <p:cNvSpPr>
+            <a:spLocks noGrp="1"/>
+          </p:cNvSpPr>
+          <p:nvPr>
+            <p:ph type="ftr" sz="quarter" idx="11"/>
+          </p:nvPr>
+        </p:nvSpPr>
+        <p:spPr/>
+        <p:txBody>
+          <a:bodyPr/>
+          <a:lstStyle/>
+          <a:p>
+            <a:r>
+              <a:rPr lang="es-ES"/>
+              <a:t>Step 1 - Model - ver. 1</a:t>
+            </a:r>
+            <a:endParaRPr lang="ru-UA"/>
+          </a:p>
+        </p:txBody>
+      </p:sp>
+      <p:pic>
+        <p:nvPicPr>
+          <p:cNvPr id="4" name="Picture 3">
+            <a:extLst>
+              <a:ext uri="{FF2B5EF4-FFF2-40B4-BE49-F238E27FC236}">
+                <a16:creationId xmlns:a16="http://schemas.microsoft.com/office/drawing/2014/main" id="{28F107C1-9081-8DFF-32B6-95CB69F19DC1}"/>
+              </a:ext>
+            </a:extLst>
+          </p:cNvPr>
+          <p:cNvPicPr>
+            <a:picLocks noChangeAspect="1"/>
+          </p:cNvPicPr>
+          <p:nvPr/>
+        </p:nvPicPr>
+        <p:blipFill>
+          <a:blip r:embed="rId2"/>
+          <a:stretch>
+            <a:fillRect/>
+          </a:stretch>
+        </p:blipFill>
+        <p:spPr>
+          <a:xfrm>
+            <a:off x="4360395" y="1093788"/>
+            <a:ext cx="7527579" cy="4716174"/>
+          </a:xfrm>
+          <a:prstGeom prst="rect">
+            <a:avLst/>
+          </a:prstGeom>
+        </p:spPr>
+      </p:pic>
+    </p:spTree>
+    <p:extLst>
+      <p:ext uri="{BB962C8B-B14F-4D97-AF65-F5344CB8AC3E}">
+        <p14:creationId xmlns:p14="http://schemas.microsoft.com/office/powerpoint/2010/main" val="1227530818"/>
+      </p:ext>
+    </p:extLst>
+  </p:cSld>
+  <p:clrMapOvr>
+    <a:masterClrMapping/>
+  </p:clrMapOvr>
+</p:sld>
+</file>
+
+<file path=ppt/slides/slide41.xml><?xml version="1.0" encoding="utf-8"?>
+<p:sld xmlns:a="http://schemas.openxmlformats.org/drawingml/2006/main" xmlns:r="http://schemas.openxmlformats.org/officeDocument/2006/relationships" xmlns:p="http://schemas.openxmlformats.org/presentationml/2006/main">
+  <p:cSld>
+    <p:bg>
+      <p:bgPr>
+        <a:solidFill>
+          <a:schemeClr val="bg1"/>
+        </a:solidFill>
+        <a:effectLst/>
+      </p:bgPr>
+    </p:bg>
+    <p:spTree>
+      <p:nvGrpSpPr>
+        <p:cNvPr id="1" name=""/>
+        <p:cNvGrpSpPr/>
+        <p:nvPr/>
+      </p:nvGrpSpPr>
+      <p:grpSpPr>
+        <a:xfrm>
+          <a:off x="0" y="0"/>
+          <a:ext cx="0" cy="0"/>
+          <a:chOff x="0" y="0"/>
+          <a:chExt cx="0" cy="0"/>
+        </a:xfrm>
+      </p:grpSpPr>
+      <p:sp>
+        <p:nvSpPr>
+          <p:cNvPr id="24" name="Down Arrow 7">
+            <a:extLst>
+              <a:ext uri="{FF2B5EF4-FFF2-40B4-BE49-F238E27FC236}">
+                <a16:creationId xmlns:a16="http://schemas.microsoft.com/office/drawing/2014/main" id="{D4771268-CB57-404A-9271-370EB28F6090}"/>
+              </a:ext>
+              <a:ext uri="{C183D7F6-B498-43B3-948B-1728B52AA6E4}">
+                <adec:decorative xmlns:adec="http://schemas.microsoft.com/office/drawing/2017/decorative" val="1"/>
+              </a:ext>
+            </a:extLst>
+          </p:cNvPr>
+          <p:cNvSpPr>
+            <a:spLocks noGrp="1" noRot="1" noChangeAspect="1" noMove="1" noResize="1" noEditPoints="1" noAdjustHandles="1" noChangeArrowheads="1" noChangeShapeType="1" noTextEdit="1"/>
+          </p:cNvSpPr>
+          <p:nvPr>
+            <p:extLst>
+              <p:ext uri="{386F3935-93C4-4BCD-93E2-E3B085C9AB24}">
+                <p16:designElem xmlns:p16="http://schemas.microsoft.com/office/powerpoint/2015/main" val="1"/>
+              </p:ext>
+            </p:extLst>
+          </p:nvPr>
+        </p:nvSpPr>
+        <p:spPr>
+          <a:xfrm rot="16200000">
+            <a:off x="800100" y="1491343"/>
+            <a:ext cx="3333749" cy="3499103"/>
+          </a:xfrm>
+          <a:prstGeom prst="downArrow">
+            <a:avLst>
+              <a:gd name="adj1" fmla="val 100000"/>
+              <a:gd name="adj2" fmla="val 15788"/>
+            </a:avLst>
+          </a:prstGeom>
+          <a:solidFill>
+            <a:srgbClr val="404040"/>
+          </a:solidFill>
+          <a:ln w="53975">
+            <a:noFill/>
+          </a:ln>
+        </p:spPr>
+        <p:style>
+          <a:lnRef idx="2">
+            <a:schemeClr val="accent1">
+              <a:shade val="50000"/>
+            </a:schemeClr>
+          </a:lnRef>
+          <a:fillRef idx="1">
+            <a:schemeClr val="accent1"/>
+          </a:fillRef>
+          <a:effectRef idx="0">
+            <a:schemeClr val="accent1"/>
+          </a:effectRef>
+          <a:fontRef idx="minor">
+            <a:schemeClr val="lt1"/>
+          </a:fontRef>
+        </p:style>
+        <p:txBody>
+          <a:bodyPr rtlCol="0" anchor="ctr"/>
+          <a:lstStyle/>
+          <a:p>
+            <a:pPr algn="ctr"/>
+            <a:endParaRPr lang="en-US"/>
+          </a:p>
+        </p:txBody>
+      </p:sp>
+      <p:sp>
+        <p:nvSpPr>
+          <p:cNvPr id="2" name="Title 1">
+            <a:extLst>
+              <a:ext uri="{FF2B5EF4-FFF2-40B4-BE49-F238E27FC236}">
+                <a16:creationId xmlns:a16="http://schemas.microsoft.com/office/drawing/2014/main" id="{53C5D828-9666-E312-B574-9FE965A7D6BE}"/>
+              </a:ext>
+            </a:extLst>
+          </p:cNvPr>
+          <p:cNvSpPr>
+            <a:spLocks noGrp="1"/>
+          </p:cNvSpPr>
+          <p:nvPr>
+            <p:ph type="title"/>
+          </p:nvPr>
+        </p:nvSpPr>
+        <p:spPr>
+          <a:xfrm>
+            <a:off x="889000" y="1967266"/>
+            <a:ext cx="2865582" cy="2547257"/>
+          </a:xfrm>
+          <a:noFill/>
+        </p:spPr>
+        <p:txBody>
+          <a:bodyPr vert="horz" lIns="91440" tIns="45720" rIns="91440" bIns="45720" rtlCol="0" anchor="ctr">
+            <a:normAutofit/>
+          </a:bodyPr>
+          <a:lstStyle/>
+          <a:p>
+            <a:pPr algn="ctr"/>
+            <a:r>
+              <a:rPr lang="en-US" sz="3600" kern="1200" dirty="0">
+                <a:solidFill>
+                  <a:srgbClr val="FFFFFF"/>
+                </a:solidFill>
+                <a:latin typeface="+mj-lt"/>
+                <a:ea typeface="+mj-ea"/>
+                <a:cs typeface="+mj-cs"/>
+              </a:rPr>
+              <a:t>Azure Monitor - Log Analytics</a:t>
+            </a:r>
+          </a:p>
+        </p:txBody>
+      </p:sp>
+      <p:sp>
+        <p:nvSpPr>
+          <p:cNvPr id="3" name="Footer Placeholder 2">
+            <a:extLst>
+              <a:ext uri="{FF2B5EF4-FFF2-40B4-BE49-F238E27FC236}">
+                <a16:creationId xmlns:a16="http://schemas.microsoft.com/office/drawing/2014/main" id="{5AA19FA0-A765-8169-03F1-928E3EF7B595}"/>
+              </a:ext>
+            </a:extLst>
+          </p:cNvPr>
+          <p:cNvSpPr>
+            <a:spLocks noGrp="1"/>
+          </p:cNvSpPr>
+          <p:nvPr>
+            <p:ph type="ftr" sz="quarter" idx="11"/>
+          </p:nvPr>
+        </p:nvSpPr>
+        <p:spPr/>
+        <p:txBody>
+          <a:bodyPr/>
+          <a:lstStyle/>
+          <a:p>
+            <a:r>
+              <a:rPr lang="es-ES"/>
+              <a:t>Step 1 - Model - ver. 1</a:t>
+            </a:r>
+            <a:endParaRPr lang="ru-UA"/>
+          </a:p>
+        </p:txBody>
+      </p:sp>
+      <p:pic>
+        <p:nvPicPr>
+          <p:cNvPr id="5" name="Picture 4">
+            <a:extLst>
+              <a:ext uri="{FF2B5EF4-FFF2-40B4-BE49-F238E27FC236}">
+                <a16:creationId xmlns:a16="http://schemas.microsoft.com/office/drawing/2014/main" id="{1E6DB63B-EC74-3639-FEE4-934B615E45D7}"/>
+              </a:ext>
+            </a:extLst>
+          </p:cNvPr>
+          <p:cNvPicPr>
+            <a:picLocks noChangeAspect="1"/>
+          </p:cNvPicPr>
+          <p:nvPr/>
+        </p:nvPicPr>
+        <p:blipFill>
+          <a:blip r:embed="rId2"/>
+          <a:stretch>
+            <a:fillRect/>
+          </a:stretch>
+        </p:blipFill>
+        <p:spPr>
+          <a:xfrm>
+            <a:off x="4520569" y="1317896"/>
+            <a:ext cx="7379206" cy="3966085"/>
+          </a:xfrm>
+          <a:prstGeom prst="rect">
+            <a:avLst/>
+          </a:prstGeom>
+        </p:spPr>
+      </p:pic>
+    </p:spTree>
+    <p:extLst>
+      <p:ext uri="{BB962C8B-B14F-4D97-AF65-F5344CB8AC3E}">
+        <p14:creationId xmlns:p14="http://schemas.microsoft.com/office/powerpoint/2010/main" val="3182037683"/>
+      </p:ext>
+    </p:extLst>
+  </p:cSld>
+  <p:clrMapOvr>
+    <a:masterClrMapping/>
+  </p:clrMapOvr>
+</p:sld>
+</file>
+
+<file path=ppt/slides/slide42.xml><?xml version="1.0" encoding="utf-8"?>
+<p:sld xmlns:a="http://schemas.openxmlformats.org/drawingml/2006/main" xmlns:r="http://schemas.openxmlformats.org/officeDocument/2006/relationships" xmlns:p="http://schemas.openxmlformats.org/presentationml/2006/main">
+  <p:cSld>
+    <p:bg>
+      <p:bgPr>
+        <a:solidFill>
+          <a:schemeClr val="bg1"/>
+        </a:solidFill>
+        <a:effectLst/>
+      </p:bgPr>
+    </p:bg>
+    <p:spTree>
+      <p:nvGrpSpPr>
+        <p:cNvPr id="1" name=""/>
+        <p:cNvGrpSpPr/>
+        <p:nvPr/>
+      </p:nvGrpSpPr>
+      <p:grpSpPr>
+        <a:xfrm>
+          <a:off x="0" y="0"/>
+          <a:ext cx="0" cy="0"/>
+          <a:chOff x="0" y="0"/>
+          <a:chExt cx="0" cy="0"/>
+        </a:xfrm>
+      </p:grpSpPr>
+      <p:sp>
+        <p:nvSpPr>
+          <p:cNvPr id="24" name="Down Arrow 7">
+            <a:extLst>
+              <a:ext uri="{FF2B5EF4-FFF2-40B4-BE49-F238E27FC236}">
+                <a16:creationId xmlns:a16="http://schemas.microsoft.com/office/drawing/2014/main" id="{D4771268-CB57-404A-9271-370EB28F6090}"/>
+              </a:ext>
+              <a:ext uri="{C183D7F6-B498-43B3-948B-1728B52AA6E4}">
+                <adec:decorative xmlns:adec="http://schemas.microsoft.com/office/drawing/2017/decorative" val="1"/>
+              </a:ext>
+            </a:extLst>
+          </p:cNvPr>
+          <p:cNvSpPr>
+            <a:spLocks noGrp="1" noRot="1" noChangeAspect="1" noMove="1" noResize="1" noEditPoints="1" noAdjustHandles="1" noChangeArrowheads="1" noChangeShapeType="1" noTextEdit="1"/>
+          </p:cNvSpPr>
+          <p:nvPr>
+            <p:extLst>
+              <p:ext uri="{386F3935-93C4-4BCD-93E2-E3B085C9AB24}">
+                <p16:designElem xmlns:p16="http://schemas.microsoft.com/office/powerpoint/2015/main" val="1"/>
+              </p:ext>
+            </p:extLst>
+          </p:nvPr>
+        </p:nvSpPr>
+        <p:spPr>
+          <a:xfrm rot="16200000">
+            <a:off x="800100" y="1491343"/>
+            <a:ext cx="3333749" cy="3499103"/>
+          </a:xfrm>
+          <a:prstGeom prst="downArrow">
+            <a:avLst>
+              <a:gd name="adj1" fmla="val 100000"/>
+              <a:gd name="adj2" fmla="val 15788"/>
+            </a:avLst>
+          </a:prstGeom>
+          <a:solidFill>
+            <a:srgbClr val="404040"/>
+          </a:solidFill>
+          <a:ln w="53975">
+            <a:noFill/>
+          </a:ln>
+        </p:spPr>
+        <p:style>
+          <a:lnRef idx="2">
+            <a:schemeClr val="accent1">
+              <a:shade val="50000"/>
+            </a:schemeClr>
+          </a:lnRef>
+          <a:fillRef idx="1">
+            <a:schemeClr val="accent1"/>
+          </a:fillRef>
+          <a:effectRef idx="0">
+            <a:schemeClr val="accent1"/>
+          </a:effectRef>
+          <a:fontRef idx="minor">
+            <a:schemeClr val="lt1"/>
+          </a:fontRef>
+        </p:style>
+        <p:txBody>
+          <a:bodyPr rtlCol="0" anchor="ctr"/>
+          <a:lstStyle/>
+          <a:p>
+            <a:pPr algn="ctr"/>
+            <a:endParaRPr lang="en-US"/>
+          </a:p>
+        </p:txBody>
+      </p:sp>
+      <p:sp>
+        <p:nvSpPr>
+          <p:cNvPr id="2" name="Title 1">
+            <a:extLst>
+              <a:ext uri="{FF2B5EF4-FFF2-40B4-BE49-F238E27FC236}">
+                <a16:creationId xmlns:a16="http://schemas.microsoft.com/office/drawing/2014/main" id="{53C5D828-9666-E312-B574-9FE965A7D6BE}"/>
+              </a:ext>
+            </a:extLst>
+          </p:cNvPr>
+          <p:cNvSpPr>
+            <a:spLocks noGrp="1"/>
+          </p:cNvSpPr>
+          <p:nvPr>
+            <p:ph type="title"/>
+          </p:nvPr>
+        </p:nvSpPr>
+        <p:spPr>
+          <a:xfrm>
+            <a:off x="889000" y="1967266"/>
+            <a:ext cx="2865582" cy="2547257"/>
+          </a:xfrm>
+          <a:noFill/>
+        </p:spPr>
+        <p:txBody>
+          <a:bodyPr vert="horz" lIns="91440" tIns="45720" rIns="91440" bIns="45720" rtlCol="0" anchor="ctr">
+            <a:normAutofit/>
+          </a:bodyPr>
+          <a:lstStyle/>
+          <a:p>
+            <a:pPr algn="ctr"/>
+            <a:r>
+              <a:rPr lang="en-US" sz="3600" kern="1200" dirty="0">
+                <a:solidFill>
+                  <a:srgbClr val="FFFFFF"/>
+                </a:solidFill>
+                <a:latin typeface="+mj-lt"/>
+                <a:ea typeface="+mj-ea"/>
+                <a:cs typeface="+mj-cs"/>
+              </a:rPr>
+              <a:t>Cost Management and Billing</a:t>
+            </a:r>
+          </a:p>
+        </p:txBody>
+      </p:sp>
+      <p:sp>
+        <p:nvSpPr>
+          <p:cNvPr id="3" name="Footer Placeholder 2">
+            <a:extLst>
+              <a:ext uri="{FF2B5EF4-FFF2-40B4-BE49-F238E27FC236}">
+                <a16:creationId xmlns:a16="http://schemas.microsoft.com/office/drawing/2014/main" id="{5AA19FA0-A765-8169-03F1-928E3EF7B595}"/>
+              </a:ext>
+            </a:extLst>
+          </p:cNvPr>
+          <p:cNvSpPr>
+            <a:spLocks noGrp="1"/>
+          </p:cNvSpPr>
+          <p:nvPr>
+            <p:ph type="ftr" sz="quarter" idx="11"/>
+          </p:nvPr>
+        </p:nvSpPr>
+        <p:spPr/>
+        <p:txBody>
+          <a:bodyPr/>
+          <a:lstStyle/>
+          <a:p>
+            <a:r>
+              <a:rPr lang="es-ES"/>
+              <a:t>Step 1 - Model - ver. 1</a:t>
+            </a:r>
+            <a:endParaRPr lang="ru-UA"/>
+          </a:p>
+        </p:txBody>
+      </p:sp>
+      <p:pic>
+        <p:nvPicPr>
+          <p:cNvPr id="4" name="Picture 3">
+            <a:extLst>
+              <a:ext uri="{FF2B5EF4-FFF2-40B4-BE49-F238E27FC236}">
+                <a16:creationId xmlns:a16="http://schemas.microsoft.com/office/drawing/2014/main" id="{D70C559A-B513-CDBF-7D13-F0CDDD4A9E3B}"/>
+              </a:ext>
+            </a:extLst>
+          </p:cNvPr>
+          <p:cNvPicPr>
+            <a:picLocks noChangeAspect="1"/>
+          </p:cNvPicPr>
+          <p:nvPr/>
+        </p:nvPicPr>
+        <p:blipFill>
+          <a:blip r:embed="rId2"/>
+          <a:stretch>
+            <a:fillRect/>
+          </a:stretch>
+        </p:blipFill>
+        <p:spPr>
+          <a:xfrm>
+            <a:off x="4788794" y="1787524"/>
+            <a:ext cx="6729212" cy="3056659"/>
+          </a:xfrm>
+          <a:prstGeom prst="rect">
+            <a:avLst/>
+          </a:prstGeom>
+        </p:spPr>
+      </p:pic>
+    </p:spTree>
+    <p:extLst>
+      <p:ext uri="{BB962C8B-B14F-4D97-AF65-F5344CB8AC3E}">
+        <p14:creationId xmlns:p14="http://schemas.microsoft.com/office/powerpoint/2010/main" val="960138513"/>
       </p:ext>
     </p:extLst>
   </p:cSld>

</xml_diff>

<commit_message>
Step 5. IaC: Terraform
</commit_message>
<xml_diff>
--- a/Step04-Cloud_Platforms_presentation.pptx
+++ b/Step04-Cloud_Platforms_presentation.pptx
@@ -1454,7 +1454,7 @@
   <pc:docChgLst>
     <pc:chgData name="Ihor Aleksandrov" userId="c3051032-6b87-4db2-b257-777a0106fbd9" providerId="ADAL" clId="{1BA64282-8772-44DD-ADE1-6DE4E20DF9D4}"/>
     <pc:docChg chg="undo custSel addSld delSld modSld sldOrd addSection delSection modSection">
-      <pc:chgData name="Ihor Aleksandrov" userId="c3051032-6b87-4db2-b257-777a0106fbd9" providerId="ADAL" clId="{1BA64282-8772-44DD-ADE1-6DE4E20DF9D4}" dt="2024-01-31T08:21:19.563" v="583" actId="14100"/>
+      <pc:chgData name="Ihor Aleksandrov" userId="c3051032-6b87-4db2-b257-777a0106fbd9" providerId="ADAL" clId="{1BA64282-8772-44DD-ADE1-6DE4E20DF9D4}" dt="2024-01-31T09:07:09.665" v="584" actId="20577"/>
       <pc:docMkLst>
         <pc:docMk/>
       </pc:docMkLst>
@@ -1505,13 +1505,13 @@
         </pc:picChg>
       </pc:sldChg>
       <pc:sldChg chg="modSp mod">
-        <pc:chgData name="Ihor Aleksandrov" userId="c3051032-6b87-4db2-b257-777a0106fbd9" providerId="ADAL" clId="{1BA64282-8772-44DD-ADE1-6DE4E20DF9D4}" dt="2024-01-30T10:26:55.218" v="14" actId="20577"/>
+        <pc:chgData name="Ihor Aleksandrov" userId="c3051032-6b87-4db2-b257-777a0106fbd9" providerId="ADAL" clId="{1BA64282-8772-44DD-ADE1-6DE4E20DF9D4}" dt="2024-01-31T09:07:09.665" v="584" actId="20577"/>
         <pc:sldMkLst>
           <pc:docMk/>
           <pc:sldMk cId="2052164358" sldId="302"/>
         </pc:sldMkLst>
         <pc:spChg chg="mod">
-          <ac:chgData name="Ihor Aleksandrov" userId="c3051032-6b87-4db2-b257-777a0106fbd9" providerId="ADAL" clId="{1BA64282-8772-44DD-ADE1-6DE4E20DF9D4}" dt="2024-01-30T10:26:55.218" v="14" actId="20577"/>
+          <ac:chgData name="Ihor Aleksandrov" userId="c3051032-6b87-4db2-b257-777a0106fbd9" providerId="ADAL" clId="{1BA64282-8772-44DD-ADE1-6DE4E20DF9D4}" dt="2024-01-31T09:07:09.665" v="584" actId="20577"/>
           <ac:spMkLst>
             <pc:docMk/>
             <pc:sldMk cId="2052164358" sldId="302"/>
@@ -11469,12 +11469,20 @@
           <a:p>
             <a:pPr algn="l"/>
             <a:r>
+              <a:rPr lang="en-US" sz="8000">
+                <a:solidFill>
+                  <a:schemeClr val="bg1"/>
+                </a:solidFill>
+              </a:rPr>
+              <a:t>Step 4. </a:t>
+            </a:r>
+            <a:r>
               <a:rPr lang="en-US" sz="8000" dirty="0">
                 <a:solidFill>
                   <a:schemeClr val="bg1"/>
                 </a:solidFill>
               </a:rPr>
-              <a:t>Step 3. Cloud Platforms</a:t>
+              <a:t>Cloud Platforms</a:t>
             </a:r>
             <a:endParaRPr lang="ru-UA" sz="8000" dirty="0">
               <a:solidFill>

</xml_diff>